<commit_message>
updated presentation for further work tomorrow
</commit_message>
<xml_diff>
--- a/Active Contours Without Edges.pptx
+++ b/Active Contours Without Edges.pptx
@@ -2,12 +2,16 @@
 <file path=ppt/presentation.xml><?xml version="1.0" encoding="utf-8"?>
 <p:presentation xmlns:a="http://schemas.openxmlformats.org/drawingml/2006/main" xmlns:r="http://schemas.openxmlformats.org/officeDocument/2006/relationships" xmlns:p="http://schemas.openxmlformats.org/presentationml/2006/main" saveSubsetFonts="1">
   <p:sldMasterIdLst>
-    <p:sldMasterId id="2147483660" r:id="rId1"/>
+    <p:sldMasterId id="2147483672" r:id="rId1"/>
   </p:sldMasterIdLst>
   <p:sldIdLst>
     <p:sldId id="256" r:id="rId2"/>
     <p:sldId id="258" r:id="rId3"/>
     <p:sldId id="257" r:id="rId4"/>
+    <p:sldId id="259" r:id="rId5"/>
+    <p:sldId id="260" r:id="rId6"/>
+    <p:sldId id="262" r:id="rId7"/>
+    <p:sldId id="261" r:id="rId8"/>
   </p:sldIdLst>
   <p:sldSz cx="9144000" cy="6858000" type="screen4x3"/>
   <p:notesSz cx="6858000" cy="9144000"/>
@@ -138,8 +142,8 @@
         </p:nvSpPr>
         <p:spPr>
           <a:xfrm>
-            <a:off x="1371600" y="1859280"/>
-            <a:ext cx="6400800" cy="1295400"/>
+            <a:off x="685800" y="2130425"/>
+            <a:ext cx="7772400" cy="1470025"/>
           </a:xfrm>
         </p:spPr>
         <p:txBody>
@@ -150,71 +154,35 @@
               <a:rPr lang="en-US" smtClean="0"/>
               <a:t>Click to edit Master title style</a:t>
             </a:r>
-            <a:endParaRPr lang="en-US" dirty="0"/>
-          </a:p>
-        </p:txBody>
-      </p:sp>
-      <p:pic>
-        <p:nvPicPr>
-          <p:cNvPr id="8" name="Picture 7" descr="flourish2.png"/>
-          <p:cNvPicPr>
-            <a:picLocks noChangeAspect="1"/>
-          </p:cNvPicPr>
-          <p:nvPr/>
-        </p:nvPicPr>
-        <p:blipFill>
-          <a:blip r:embed="rId2">
-            <a:duotone>
-              <a:prstClr val="black"/>
-              <a:schemeClr val="tx2">
-                <a:tint val="45000"/>
-                <a:satMod val="400000"/>
-              </a:schemeClr>
-            </a:duotone>
-            <a:lum bright="-14000"/>
-          </a:blip>
-          <a:stretch>
-            <a:fillRect/>
-          </a:stretch>
-        </p:blipFill>
+            <a:endParaRPr lang="en-GB"/>
+          </a:p>
+        </p:txBody>
+      </p:sp>
+      <p:sp>
+        <p:nvSpPr>
+          <p:cNvPr id="3" name="Subtitle 2"/>
+          <p:cNvSpPr>
+            <a:spLocks noGrp="1"/>
+          </p:cNvSpPr>
+          <p:nvPr>
+            <p:ph type="subTitle" idx="1"/>
+          </p:nvPr>
+        </p:nvSpPr>
         <p:spPr>
           <a:xfrm>
-            <a:off x="0" y="2801112"/>
-            <a:ext cx="9144000" cy="932688"/>
-          </a:xfrm>
-          <a:prstGeom prst="rect">
-            <a:avLst/>
-          </a:prstGeom>
-        </p:spPr>
-      </p:pic>
-      <p:sp>
-        <p:nvSpPr>
-          <p:cNvPr id="3" name="Subtitle 2"/>
-          <p:cNvSpPr>
-            <a:spLocks noGrp="1"/>
-          </p:cNvSpPr>
-          <p:nvPr>
-            <p:ph type="subTitle" idx="1"/>
-          </p:nvPr>
-        </p:nvSpPr>
-        <p:spPr>
-          <a:xfrm>
-            <a:off x="1371600" y="3429000"/>
-            <a:ext cx="6400800" cy="762000"/>
+            <a:off x="1371600" y="3886200"/>
+            <a:ext cx="6400800" cy="1752600"/>
           </a:xfrm>
         </p:spPr>
         <p:txBody>
-          <a:bodyPr>
-            <a:normAutofit/>
-          </a:bodyPr>
+          <a:bodyPr/>
           <a:lstStyle>
             <a:lvl1pPr marL="0" indent="0" algn="ctr">
               <a:buNone/>
-              <a:defRPr sz="2000" i="1" baseline="0">
+              <a:defRPr>
                 <a:solidFill>
                   <a:schemeClr val="tx1">
-                    <a:lumMod val="65000"/>
-                    <a:lumOff val="35000"/>
+                    <a:tint val="75000"/>
                   </a:schemeClr>
                 </a:solidFill>
               </a:defRPr>
@@ -305,7 +273,7 @@
               <a:rPr lang="en-US" smtClean="0"/>
               <a:t>Click to edit Master subtitle style</a:t>
             </a:r>
-            <a:endParaRPr lang="en-US" dirty="0"/>
+            <a:endParaRPr lang="en-GB"/>
           </a:p>
         </p:txBody>
       </p:sp>
@@ -319,14 +287,15 @@
             <p:ph type="dt" sz="half" idx="10"/>
           </p:nvPr>
         </p:nvSpPr>
-        <p:spPr bwMode="white"/>
+        <p:spPr/>
         <p:txBody>
           <a:bodyPr/>
           <a:lstStyle/>
           <a:p>
             <a:fld id="{7F97EE62-E3D0-4E7B-B469-EAEE700658EE}" type="datetimeFigureOut">
               <a:rPr lang="en-GB" smtClean="0"/>
-              <a:t>16/02/2012</a:t>
+              <a:pPr/>
+              <a:t>19/02/2012</a:t>
             </a:fld>
             <a:endParaRPr lang="en-GB"/>
           </a:p>
@@ -342,7 +311,7 @@
             <p:ph type="ftr" sz="quarter" idx="11"/>
           </p:nvPr>
         </p:nvSpPr>
-        <p:spPr bwMode="white"/>
+        <p:spPr/>
         <p:txBody>
           <a:bodyPr/>
           <a:lstStyle/>
@@ -368,6 +337,7 @@
           <a:p>
             <a:fld id="{5D8511BD-094F-4FD0-B9E7-C347FC64F4DF}" type="slidenum">
               <a:rPr lang="en-GB" smtClean="0"/>
+              <a:pPr/>
               <a:t>‹#›</a:t>
             </a:fld>
             <a:endParaRPr lang="en-GB"/>
@@ -418,7 +388,7 @@
               <a:rPr lang="en-US" smtClean="0"/>
               <a:t>Click to edit Master title style</a:t>
             </a:r>
-            <a:endParaRPr lang="en-US"/>
+            <a:endParaRPr lang="en-GB"/>
           </a:p>
         </p:txBody>
       </p:sp>
@@ -470,7 +440,7 @@
               <a:rPr lang="en-US" smtClean="0"/>
               <a:t>Fifth level</a:t>
             </a:r>
-            <a:endParaRPr lang="en-US"/>
+            <a:endParaRPr lang="en-GB"/>
           </a:p>
         </p:txBody>
       </p:sp>
@@ -491,7 +461,8 @@
           <a:p>
             <a:fld id="{7F97EE62-E3D0-4E7B-B469-EAEE700658EE}" type="datetimeFigureOut">
               <a:rPr lang="en-GB" smtClean="0"/>
-              <a:t>16/02/2012</a:t>
+              <a:pPr/>
+              <a:t>19/02/2012</a:t>
             </a:fld>
             <a:endParaRPr lang="en-GB"/>
           </a:p>
@@ -533,6 +504,7 @@
           <a:p>
             <a:fld id="{5D8511BD-094F-4FD0-B9E7-C347FC64F4DF}" type="slidenum">
               <a:rPr lang="en-GB" smtClean="0"/>
+              <a:pPr/>
               <a:t>‹#›</a:t>
             </a:fld>
             <a:endParaRPr lang="en-GB"/>
@@ -576,8 +548,8 @@
         </p:nvSpPr>
         <p:spPr>
           <a:xfrm>
-            <a:off x="6629400" y="1209041"/>
-            <a:ext cx="1295400" cy="4318000"/>
+            <a:off x="6629400" y="274638"/>
+            <a:ext cx="2057400" cy="5851525"/>
           </a:xfrm>
         </p:spPr>
         <p:txBody>
@@ -588,7 +560,7 @@
               <a:rPr lang="en-US" smtClean="0"/>
               <a:t>Click to edit Master title style</a:t>
             </a:r>
-            <a:endParaRPr lang="en-US" dirty="0"/>
+            <a:endParaRPr lang="en-GB"/>
           </a:p>
         </p:txBody>
       </p:sp>
@@ -604,8 +576,8 @@
         </p:nvSpPr>
         <p:spPr>
           <a:xfrm>
-            <a:off x="1295400" y="1219199"/>
-            <a:ext cx="5181600" cy="4267201"/>
+            <a:off x="457200" y="274638"/>
+            <a:ext cx="6019800" cy="5851525"/>
           </a:xfrm>
         </p:spPr>
         <p:txBody>
@@ -645,7 +617,7 @@
               <a:rPr lang="en-US" smtClean="0"/>
               <a:t>Fifth level</a:t>
             </a:r>
-            <a:endParaRPr lang="en-US" dirty="0"/>
+            <a:endParaRPr lang="en-GB"/>
           </a:p>
         </p:txBody>
       </p:sp>
@@ -666,7 +638,8 @@
           <a:p>
             <a:fld id="{7F97EE62-E3D0-4E7B-B469-EAEE700658EE}" type="datetimeFigureOut">
               <a:rPr lang="en-GB" smtClean="0"/>
-              <a:t>16/02/2012</a:t>
+              <a:pPr/>
+              <a:t>19/02/2012</a:t>
             </a:fld>
             <a:endParaRPr lang="en-GB"/>
           </a:p>
@@ -708,6 +681,7 @@
           <a:p>
             <a:fld id="{5D8511BD-094F-4FD0-B9E7-C347FC64F4DF}" type="slidenum">
               <a:rPr lang="en-GB" smtClean="0"/>
+              <a:pPr/>
               <a:t>‹#›</a:t>
             </a:fld>
             <a:endParaRPr lang="en-GB"/>
@@ -758,7 +732,7 @@
               <a:rPr lang="en-US" smtClean="0"/>
               <a:t>Click to edit Master title style</a:t>
             </a:r>
-            <a:endParaRPr lang="en-US" dirty="0"/>
+            <a:endParaRPr lang="en-GB"/>
           </a:p>
         </p:txBody>
       </p:sp>
@@ -772,12 +746,7 @@
             <p:ph idx="1"/>
           </p:nvPr>
         </p:nvSpPr>
-        <p:spPr>
-          <a:xfrm>
-            <a:off x="1371600" y="2438400"/>
-            <a:ext cx="6400800" cy="3048001"/>
-          </a:xfrm>
-        </p:spPr>
+        <p:spPr/>
         <p:txBody>
           <a:bodyPr/>
           <a:lstStyle/>
@@ -815,7 +784,7 @@
               <a:rPr lang="en-US" smtClean="0"/>
               <a:t>Fifth level</a:t>
             </a:r>
-            <a:endParaRPr lang="en-US" dirty="0"/>
+            <a:endParaRPr lang="en-GB"/>
           </a:p>
         </p:txBody>
       </p:sp>
@@ -836,7 +805,8 @@
           <a:p>
             <a:fld id="{7F97EE62-E3D0-4E7B-B469-EAEE700658EE}" type="datetimeFigureOut">
               <a:rPr lang="en-GB" smtClean="0"/>
-              <a:t>16/02/2012</a:t>
+              <a:pPr/>
+              <a:t>19/02/2012</a:t>
             </a:fld>
             <a:endParaRPr lang="en-GB"/>
           </a:p>
@@ -878,45 +848,13 @@
           <a:p>
             <a:fld id="{5D8511BD-094F-4FD0-B9E7-C347FC64F4DF}" type="slidenum">
               <a:rPr lang="en-GB" smtClean="0"/>
+              <a:pPr/>
               <a:t>‹#›</a:t>
             </a:fld>
             <a:endParaRPr lang="en-GB"/>
           </a:p>
         </p:txBody>
       </p:sp>
-      <p:pic>
-        <p:nvPicPr>
-          <p:cNvPr id="9" name="Picture 8" descr="flourish2.png"/>
-          <p:cNvPicPr>
-            <a:picLocks noChangeAspect="1"/>
-          </p:cNvPicPr>
-          <p:nvPr/>
-        </p:nvPicPr>
-        <p:blipFill>
-          <a:blip r:embed="rId2">
-            <a:duotone>
-              <a:prstClr val="black"/>
-              <a:schemeClr val="tx2">
-                <a:tint val="45000"/>
-                <a:satMod val="400000"/>
-              </a:schemeClr>
-            </a:duotone>
-            <a:lum bright="-14000"/>
-          </a:blip>
-          <a:stretch>
-            <a:fillRect/>
-          </a:stretch>
-        </p:blipFill>
-        <p:spPr>
-          <a:xfrm>
-            <a:off x="0" y="1618488"/>
-            <a:ext cx="9144000" cy="932688"/>
-          </a:xfrm>
-          <a:prstGeom prst="rect">
-            <a:avLst/>
-          </a:prstGeom>
-        </p:spPr>
-      </p:pic>
     </p:spTree>
   </p:cSld>
   <p:clrMapOvr>
@@ -944,162 +882,61 @@
       </p:grpSpPr>
       <p:sp>
         <p:nvSpPr>
-          <p:cNvPr id="4" name="Date Placeholder 3"/>
-          <p:cNvSpPr>
-            <a:spLocks noGrp="1"/>
-          </p:cNvSpPr>
-          <p:nvPr>
-            <p:ph type="dt" sz="half" idx="10"/>
-          </p:nvPr>
-        </p:nvSpPr>
-        <p:spPr/>
-        <p:txBody>
-          <a:bodyPr/>
-          <a:lstStyle/>
-          <a:p>
-            <a:fld id="{7F97EE62-E3D0-4E7B-B469-EAEE700658EE}" type="datetimeFigureOut">
-              <a:rPr lang="en-GB" smtClean="0"/>
-              <a:t>16/02/2012</a:t>
-            </a:fld>
-            <a:endParaRPr lang="en-GB"/>
-          </a:p>
-        </p:txBody>
-      </p:sp>
-      <p:sp>
-        <p:nvSpPr>
-          <p:cNvPr id="5" name="Footer Placeholder 4"/>
-          <p:cNvSpPr>
-            <a:spLocks noGrp="1"/>
-          </p:cNvSpPr>
-          <p:nvPr>
-            <p:ph type="ftr" sz="quarter" idx="11"/>
-          </p:nvPr>
-        </p:nvSpPr>
-        <p:spPr/>
-        <p:txBody>
-          <a:bodyPr/>
-          <a:lstStyle/>
-          <a:p>
-            <a:endParaRPr lang="en-GB"/>
-          </a:p>
-        </p:txBody>
-      </p:sp>
-      <p:sp>
-        <p:nvSpPr>
-          <p:cNvPr id="6" name="Slide Number Placeholder 5"/>
-          <p:cNvSpPr>
-            <a:spLocks noGrp="1"/>
-          </p:cNvSpPr>
-          <p:nvPr>
-            <p:ph type="sldNum" sz="quarter" idx="12"/>
-          </p:nvPr>
-        </p:nvSpPr>
-        <p:spPr/>
-        <p:txBody>
-          <a:bodyPr/>
-          <a:lstStyle/>
-          <a:p>
-            <a:fld id="{5D8511BD-094F-4FD0-B9E7-C347FC64F4DF}" type="slidenum">
-              <a:rPr lang="en-GB" smtClean="0"/>
-              <a:t>‹#›</a:t>
-            </a:fld>
-            <a:endParaRPr lang="en-GB"/>
-          </a:p>
-        </p:txBody>
-      </p:sp>
-      <p:pic>
-        <p:nvPicPr>
-          <p:cNvPr id="7" name="Picture 6" descr="flourish2.png"/>
-          <p:cNvPicPr>
-            <a:picLocks noChangeAspect="1"/>
-          </p:cNvPicPr>
-          <p:nvPr/>
-        </p:nvPicPr>
-        <p:blipFill>
-          <a:blip r:embed="rId2">
-            <a:duotone>
-              <a:prstClr val="black"/>
-              <a:schemeClr val="tx2">
-                <a:tint val="45000"/>
-                <a:satMod val="400000"/>
-              </a:schemeClr>
-            </a:duotone>
-            <a:lum bright="-14000"/>
-          </a:blip>
-          <a:stretch>
-            <a:fillRect/>
-          </a:stretch>
-        </p:blipFill>
+          <p:cNvPr id="2" name="Title 1"/>
+          <p:cNvSpPr>
+            <a:spLocks noGrp="1"/>
+          </p:cNvSpPr>
+          <p:nvPr>
+            <p:ph type="title"/>
+          </p:nvPr>
+        </p:nvSpPr>
         <p:spPr>
           <a:xfrm>
-            <a:off x="0" y="2684462"/>
-            <a:ext cx="9144000" cy="932688"/>
+            <a:off x="722313" y="4406900"/>
+            <a:ext cx="7772400" cy="1362075"/>
           </a:xfrm>
-          <a:prstGeom prst="rect">
-            <a:avLst/>
-          </a:prstGeom>
         </p:spPr>
-      </p:pic>
-      <p:sp>
-        <p:nvSpPr>
-          <p:cNvPr id="2" name="Title 1"/>
-          <p:cNvSpPr>
-            <a:spLocks noGrp="1"/>
-          </p:cNvSpPr>
-          <p:nvPr>
-            <p:ph type="title"/>
+        <p:txBody>
+          <a:bodyPr anchor="t"/>
+          <a:lstStyle>
+            <a:lvl1pPr algn="l">
+              <a:defRPr sz="4000" b="1" cap="all"/>
+            </a:lvl1pPr>
+          </a:lstStyle>
+          <a:p>
+            <a:r>
+              <a:rPr lang="en-US" smtClean="0"/>
+              <a:t>Click to edit Master title style</a:t>
+            </a:r>
+            <a:endParaRPr lang="en-GB"/>
+          </a:p>
+        </p:txBody>
+      </p:sp>
+      <p:sp>
+        <p:nvSpPr>
+          <p:cNvPr id="3" name="Text Placeholder 2"/>
+          <p:cNvSpPr>
+            <a:spLocks noGrp="1"/>
+          </p:cNvSpPr>
+          <p:nvPr>
+            <p:ph type="body" idx="1"/>
           </p:nvPr>
         </p:nvSpPr>
         <p:spPr>
           <a:xfrm>
-            <a:off x="1447800" y="3410267"/>
-            <a:ext cx="6248400" cy="1456373"/>
+            <a:off x="722313" y="2906713"/>
+            <a:ext cx="7772400" cy="1500187"/>
           </a:xfrm>
         </p:spPr>
         <p:txBody>
-          <a:bodyPr anchor="t">
-            <a:normAutofit/>
-          </a:bodyPr>
-          <a:lstStyle>
-            <a:lvl1pPr algn="ctr">
-              <a:defRPr sz="3600" b="0" i="0" cap="all" baseline="0"/>
-            </a:lvl1pPr>
-          </a:lstStyle>
-          <a:p>
-            <a:r>
-              <a:rPr lang="en-US" smtClean="0"/>
-              <a:t>Click to edit Master title style</a:t>
-            </a:r>
-            <a:endParaRPr lang="en-US" dirty="0"/>
-          </a:p>
-        </p:txBody>
-      </p:sp>
-      <p:sp>
-        <p:nvSpPr>
-          <p:cNvPr id="3" name="Text Placeholder 2"/>
-          <p:cNvSpPr>
-            <a:spLocks noGrp="1"/>
-          </p:cNvSpPr>
-          <p:nvPr>
-            <p:ph type="body" idx="1"/>
-          </p:nvPr>
-        </p:nvSpPr>
-        <p:spPr>
-          <a:xfrm>
-            <a:off x="1447800" y="1503680"/>
-            <a:ext cx="6248400" cy="1566862"/>
-          </a:xfrm>
-        </p:spPr>
-        <p:txBody>
           <a:bodyPr anchor="b"/>
           <a:lstStyle>
-            <a:lvl1pPr marL="0" indent="0" algn="ctr">
-              <a:buNone/>
-              <a:defRPr sz="2000" b="0" i="1" baseline="0">
+            <a:lvl1pPr marL="0" indent="0">
+              <a:buNone/>
+              <a:defRPr sz="2000">
                 <a:solidFill>
                   <a:schemeClr val="tx1">
-                    <a:lumMod val="65000"/>
-                    <a:lumOff val="35000"/>
+                    <a:tint val="75000"/>
                   </a:schemeClr>
                 </a:solidFill>
               </a:defRPr>
@@ -1194,39 +1031,73 @@
           </a:p>
         </p:txBody>
       </p:sp>
-      <p:pic>
-        <p:nvPicPr>
-          <p:cNvPr id="8" name="Picture 7" descr="flourish2.png"/>
-          <p:cNvPicPr>
-            <a:picLocks noChangeAspect="1"/>
-          </p:cNvPicPr>
-          <p:nvPr/>
-        </p:nvPicPr>
-        <p:blipFill>
-          <a:blip r:embed="rId2">
-            <a:duotone>
-              <a:prstClr val="black"/>
-              <a:schemeClr val="tx2">
-                <a:tint val="45000"/>
-                <a:satMod val="400000"/>
-              </a:schemeClr>
-            </a:duotone>
-            <a:lum bright="-14000"/>
-          </a:blip>
-          <a:stretch>
-            <a:fillRect/>
-          </a:stretch>
-        </p:blipFill>
-        <p:spPr>
-          <a:xfrm>
-            <a:off x="0" y="2684462"/>
-            <a:ext cx="9144000" cy="932688"/>
-          </a:xfrm>
-          <a:prstGeom prst="rect">
-            <a:avLst/>
-          </a:prstGeom>
-        </p:spPr>
-      </p:pic>
+      <p:sp>
+        <p:nvSpPr>
+          <p:cNvPr id="4" name="Date Placeholder 3"/>
+          <p:cNvSpPr>
+            <a:spLocks noGrp="1"/>
+          </p:cNvSpPr>
+          <p:nvPr>
+            <p:ph type="dt" sz="half" idx="10"/>
+          </p:nvPr>
+        </p:nvSpPr>
+        <p:spPr/>
+        <p:txBody>
+          <a:bodyPr/>
+          <a:lstStyle/>
+          <a:p>
+            <a:fld id="{7F97EE62-E3D0-4E7B-B469-EAEE700658EE}" type="datetimeFigureOut">
+              <a:rPr lang="en-GB" smtClean="0"/>
+              <a:pPr/>
+              <a:t>19/02/2012</a:t>
+            </a:fld>
+            <a:endParaRPr lang="en-GB"/>
+          </a:p>
+        </p:txBody>
+      </p:sp>
+      <p:sp>
+        <p:nvSpPr>
+          <p:cNvPr id="5" name="Footer Placeholder 4"/>
+          <p:cNvSpPr>
+            <a:spLocks noGrp="1"/>
+          </p:cNvSpPr>
+          <p:nvPr>
+            <p:ph type="ftr" sz="quarter" idx="11"/>
+          </p:nvPr>
+        </p:nvSpPr>
+        <p:spPr/>
+        <p:txBody>
+          <a:bodyPr/>
+          <a:lstStyle/>
+          <a:p>
+            <a:endParaRPr lang="en-GB"/>
+          </a:p>
+        </p:txBody>
+      </p:sp>
+      <p:sp>
+        <p:nvSpPr>
+          <p:cNvPr id="6" name="Slide Number Placeholder 5"/>
+          <p:cNvSpPr>
+            <a:spLocks noGrp="1"/>
+          </p:cNvSpPr>
+          <p:nvPr>
+            <p:ph type="sldNum" sz="quarter" idx="12"/>
+          </p:nvPr>
+        </p:nvSpPr>
+        <p:spPr/>
+        <p:txBody>
+          <a:bodyPr/>
+          <a:lstStyle/>
+          <a:p>
+            <a:fld id="{5D8511BD-094F-4FD0-B9E7-C347FC64F4DF}" type="slidenum">
+              <a:rPr lang="en-GB" smtClean="0"/>
+              <a:pPr/>
+              <a:t>‹#›</a:t>
+            </a:fld>
+            <a:endParaRPr lang="en-GB"/>
+          </a:p>
+        </p:txBody>
+      </p:sp>
     </p:spTree>
   </p:cSld>
   <p:clrMapOvr>
@@ -1254,23 +1125,74 @@
       </p:grpSpPr>
       <p:sp>
         <p:nvSpPr>
-          <p:cNvPr id="10" name="Content Placeholder 9"/>
-          <p:cNvSpPr>
-            <a:spLocks noGrp="1"/>
-          </p:cNvSpPr>
-          <p:nvPr>
-            <p:ph sz="quarter" idx="13"/>
+          <p:cNvPr id="2" name="Title 1"/>
+          <p:cNvSpPr>
+            <a:spLocks noGrp="1"/>
+          </p:cNvSpPr>
+          <p:nvPr>
+            <p:ph type="title"/>
+          </p:nvPr>
+        </p:nvSpPr>
+        <p:spPr/>
+        <p:txBody>
+          <a:bodyPr/>
+          <a:lstStyle/>
+          <a:p>
+            <a:r>
+              <a:rPr lang="en-US" smtClean="0"/>
+              <a:t>Click to edit Master title style</a:t>
+            </a:r>
+            <a:endParaRPr lang="en-GB"/>
+          </a:p>
+        </p:txBody>
+      </p:sp>
+      <p:sp>
+        <p:nvSpPr>
+          <p:cNvPr id="3" name="Content Placeholder 2"/>
+          <p:cNvSpPr>
+            <a:spLocks noGrp="1"/>
+          </p:cNvSpPr>
+          <p:nvPr>
+            <p:ph sz="half" idx="1"/>
           </p:nvPr>
         </p:nvSpPr>
         <p:spPr>
           <a:xfrm>
-            <a:off x="1371600" y="2438400"/>
-            <a:ext cx="3124200" cy="3124200"/>
+            <a:off x="457200" y="1600200"/>
+            <a:ext cx="4038600" cy="4525963"/>
           </a:xfrm>
         </p:spPr>
         <p:txBody>
           <a:bodyPr/>
-          <a:lstStyle/>
+          <a:lstStyle>
+            <a:lvl1pPr>
+              <a:defRPr sz="2800"/>
+            </a:lvl1pPr>
+            <a:lvl2pPr>
+              <a:defRPr sz="2400"/>
+            </a:lvl2pPr>
+            <a:lvl3pPr>
+              <a:defRPr sz="2000"/>
+            </a:lvl3pPr>
+            <a:lvl4pPr>
+              <a:defRPr sz="1800"/>
+            </a:lvl4pPr>
+            <a:lvl5pPr>
+              <a:defRPr sz="1800"/>
+            </a:lvl5pPr>
+            <a:lvl6pPr>
+              <a:defRPr sz="1800"/>
+            </a:lvl6pPr>
+            <a:lvl7pPr>
+              <a:defRPr sz="1800"/>
+            </a:lvl7pPr>
+            <a:lvl8pPr>
+              <a:defRPr sz="1800"/>
+            </a:lvl8pPr>
+            <a:lvl9pPr>
+              <a:defRPr sz="1800"/>
+            </a:lvl9pPr>
+          </a:lstStyle>
           <a:p>
             <a:pPr lvl="0"/>
             <a:r>
@@ -1305,30 +1227,92 @@
               <a:rPr lang="en-US" smtClean="0"/>
               <a:t>Fifth level</a:t>
             </a:r>
-            <a:endParaRPr lang="en-US" dirty="0"/>
-          </a:p>
-        </p:txBody>
-      </p:sp>
-      <p:sp>
-        <p:nvSpPr>
-          <p:cNvPr id="2" name="Title 1"/>
-          <p:cNvSpPr>
-            <a:spLocks noGrp="1"/>
-          </p:cNvSpPr>
-          <p:nvPr>
-            <p:ph type="title"/>
-          </p:nvPr>
-        </p:nvSpPr>
-        <p:spPr/>
-        <p:txBody>
-          <a:bodyPr/>
-          <a:lstStyle/>
-          <a:p>
-            <a:r>
-              <a:rPr lang="en-US" smtClean="0"/>
-              <a:t>Click to edit Master title style</a:t>
-            </a:r>
-            <a:endParaRPr lang="en-US"/>
+            <a:endParaRPr lang="en-GB"/>
+          </a:p>
+        </p:txBody>
+      </p:sp>
+      <p:sp>
+        <p:nvSpPr>
+          <p:cNvPr id="4" name="Content Placeholder 3"/>
+          <p:cNvSpPr>
+            <a:spLocks noGrp="1"/>
+          </p:cNvSpPr>
+          <p:nvPr>
+            <p:ph sz="half" idx="2"/>
+          </p:nvPr>
+        </p:nvSpPr>
+        <p:spPr>
+          <a:xfrm>
+            <a:off x="4648200" y="1600200"/>
+            <a:ext cx="4038600" cy="4525963"/>
+          </a:xfrm>
+        </p:spPr>
+        <p:txBody>
+          <a:bodyPr/>
+          <a:lstStyle>
+            <a:lvl1pPr>
+              <a:defRPr sz="2800"/>
+            </a:lvl1pPr>
+            <a:lvl2pPr>
+              <a:defRPr sz="2400"/>
+            </a:lvl2pPr>
+            <a:lvl3pPr>
+              <a:defRPr sz="2000"/>
+            </a:lvl3pPr>
+            <a:lvl4pPr>
+              <a:defRPr sz="1800"/>
+            </a:lvl4pPr>
+            <a:lvl5pPr>
+              <a:defRPr sz="1800"/>
+            </a:lvl5pPr>
+            <a:lvl6pPr>
+              <a:defRPr sz="1800"/>
+            </a:lvl6pPr>
+            <a:lvl7pPr>
+              <a:defRPr sz="1800"/>
+            </a:lvl7pPr>
+            <a:lvl8pPr>
+              <a:defRPr sz="1800"/>
+            </a:lvl8pPr>
+            <a:lvl9pPr>
+              <a:defRPr sz="1800"/>
+            </a:lvl9pPr>
+          </a:lstStyle>
+          <a:p>
+            <a:pPr lvl="0"/>
+            <a:r>
+              <a:rPr lang="en-US" smtClean="0"/>
+              <a:t>Click to edit Master text styles</a:t>
+            </a:r>
+          </a:p>
+          <a:p>
+            <a:pPr lvl="1"/>
+            <a:r>
+              <a:rPr lang="en-US" smtClean="0"/>
+              <a:t>Second level</a:t>
+            </a:r>
+          </a:p>
+          <a:p>
+            <a:pPr lvl="2"/>
+            <a:r>
+              <a:rPr lang="en-US" smtClean="0"/>
+              <a:t>Third level</a:t>
+            </a:r>
+          </a:p>
+          <a:p>
+            <a:pPr lvl="3"/>
+            <a:r>
+              <a:rPr lang="en-US" smtClean="0"/>
+              <a:t>Fourth level</a:t>
+            </a:r>
+          </a:p>
+          <a:p>
+            <a:pPr lvl="4"/>
+            <a:r>
+              <a:rPr lang="en-US" smtClean="0"/>
+              <a:t>Fifth level</a:t>
+            </a:r>
+            <a:endParaRPr lang="en-GB"/>
           </a:p>
         </p:txBody>
       </p:sp>
@@ -1349,7 +1333,8 @@
           <a:p>
             <a:fld id="{7F97EE62-E3D0-4E7B-B469-EAEE700658EE}" type="datetimeFigureOut">
               <a:rPr lang="en-GB" smtClean="0"/>
-              <a:t>16/02/2012</a:t>
+              <a:pPr/>
+              <a:t>19/02/2012</a:t>
             </a:fld>
             <a:endParaRPr lang="en-GB"/>
           </a:p>
@@ -1391,102 +1376,13 @@
           <a:p>
             <a:fld id="{5D8511BD-094F-4FD0-B9E7-C347FC64F4DF}" type="slidenum">
               <a:rPr lang="en-GB" smtClean="0"/>
+              <a:pPr/>
               <a:t>‹#›</a:t>
             </a:fld>
             <a:endParaRPr lang="en-GB"/>
           </a:p>
         </p:txBody>
       </p:sp>
-      <p:sp>
-        <p:nvSpPr>
-          <p:cNvPr id="12" name="Content Placeholder 11"/>
-          <p:cNvSpPr>
-            <a:spLocks noGrp="1"/>
-          </p:cNvSpPr>
-          <p:nvPr>
-            <p:ph sz="quarter" idx="14"/>
-          </p:nvPr>
-        </p:nvSpPr>
-        <p:spPr>
-          <a:xfrm>
-            <a:off x="4648200" y="2438400"/>
-            <a:ext cx="3124200" cy="3124200"/>
-          </a:xfrm>
-        </p:spPr>
-        <p:txBody>
-          <a:bodyPr/>
-          <a:lstStyle/>
-          <a:p>
-            <a:pPr lvl="0"/>
-            <a:r>
-              <a:rPr lang="en-US" smtClean="0"/>
-              <a:t>Click to edit Master text styles</a:t>
-            </a:r>
-          </a:p>
-          <a:p>
-            <a:pPr lvl="1"/>
-            <a:r>
-              <a:rPr lang="en-US" smtClean="0"/>
-              <a:t>Second level</a:t>
-            </a:r>
-          </a:p>
-          <a:p>
-            <a:pPr lvl="2"/>
-            <a:r>
-              <a:rPr lang="en-US" smtClean="0"/>
-              <a:t>Third level</a:t>
-            </a:r>
-          </a:p>
-          <a:p>
-            <a:pPr lvl="3"/>
-            <a:r>
-              <a:rPr lang="en-US" smtClean="0"/>
-              <a:t>Fourth level</a:t>
-            </a:r>
-          </a:p>
-          <a:p>
-            <a:pPr lvl="4"/>
-            <a:r>
-              <a:rPr lang="en-US" smtClean="0"/>
-              <a:t>Fifth level</a:t>
-            </a:r>
-            <a:endParaRPr lang="en-US" dirty="0"/>
-          </a:p>
-        </p:txBody>
-      </p:sp>
-      <p:pic>
-        <p:nvPicPr>
-          <p:cNvPr id="9" name="Picture 8" descr="flourish2.png"/>
-          <p:cNvPicPr>
-            <a:picLocks noChangeAspect="1"/>
-          </p:cNvPicPr>
-          <p:nvPr/>
-        </p:nvPicPr>
-        <p:blipFill>
-          <a:blip r:embed="rId2">
-            <a:duotone>
-              <a:prstClr val="black"/>
-              <a:schemeClr val="tx2">
-                <a:tint val="45000"/>
-                <a:satMod val="400000"/>
-              </a:schemeClr>
-            </a:duotone>
-            <a:lum bright="-14000"/>
-          </a:blip>
-          <a:stretch>
-            <a:fillRect/>
-          </a:stretch>
-        </p:blipFill>
-        <p:spPr>
-          <a:xfrm>
-            <a:off x="0" y="1618488"/>
-            <a:ext cx="9144000" cy="932688"/>
-          </a:xfrm>
-          <a:prstGeom prst="rect">
-            <a:avLst/>
-          </a:prstGeom>
-        </p:spPr>
-      </p:pic>
     </p:spTree>
   </p:cSld>
   <p:clrMapOvr>
@@ -1512,158 +1408,6 @@
           <a:chExt cx="0" cy="0"/>
         </a:xfrm>
       </p:grpSpPr>
-      <p:pic>
-        <p:nvPicPr>
-          <p:cNvPr id="12" name="Picture 11" descr="flourish2.png"/>
-          <p:cNvPicPr>
-            <a:picLocks noChangeAspect="1"/>
-          </p:cNvPicPr>
-          <p:nvPr/>
-        </p:nvPicPr>
-        <p:blipFill>
-          <a:blip r:embed="rId2">
-            <a:clrChange>
-              <a:clrFrom>
-                <a:srgbClr val="000000">
-                  <a:alpha val="0"/>
-                </a:srgbClr>
-              </a:clrFrom>
-              <a:clrTo>
-                <a:srgbClr val="000000">
-                  <a:alpha val="0"/>
-                </a:srgbClr>
-              </a:clrTo>
-            </a:clrChange>
-            <a:lum bright="-14000"/>
-          </a:blip>
-          <a:stretch>
-            <a:fillRect/>
-          </a:stretch>
-        </p:blipFill>
-        <p:spPr>
-          <a:xfrm>
-            <a:off x="0" y="1618488"/>
-            <a:ext cx="9144000" cy="932688"/>
-          </a:xfrm>
-          <a:prstGeom prst="rect">
-            <a:avLst/>
-          </a:prstGeom>
-        </p:spPr>
-      </p:pic>
-      <p:sp>
-        <p:nvSpPr>
-          <p:cNvPr id="11" name="Content Placeholder 10"/>
-          <p:cNvSpPr>
-            <a:spLocks noGrp="1"/>
-          </p:cNvSpPr>
-          <p:nvPr>
-            <p:ph sz="quarter" idx="13"/>
-          </p:nvPr>
-        </p:nvSpPr>
-        <p:spPr>
-          <a:xfrm>
-            <a:off x="1371600" y="2819400"/>
-            <a:ext cx="3124200" cy="2743200"/>
-          </a:xfrm>
-        </p:spPr>
-        <p:txBody>
-          <a:bodyPr/>
-          <a:lstStyle/>
-          <a:p>
-            <a:pPr lvl="0"/>
-            <a:r>
-              <a:rPr lang="en-US" smtClean="0"/>
-              <a:t>Click to edit Master text styles</a:t>
-            </a:r>
-          </a:p>
-          <a:p>
-            <a:pPr lvl="1"/>
-            <a:r>
-              <a:rPr lang="en-US" smtClean="0"/>
-              <a:t>Second level</a:t>
-            </a:r>
-          </a:p>
-          <a:p>
-            <a:pPr lvl="2"/>
-            <a:r>
-              <a:rPr lang="en-US" smtClean="0"/>
-              <a:t>Third level</a:t>
-            </a:r>
-          </a:p>
-          <a:p>
-            <a:pPr lvl="3"/>
-            <a:r>
-              <a:rPr lang="en-US" smtClean="0"/>
-              <a:t>Fourth level</a:t>
-            </a:r>
-          </a:p>
-          <a:p>
-            <a:pPr lvl="4"/>
-            <a:r>
-              <a:rPr lang="en-US" smtClean="0"/>
-              <a:t>Fifth level</a:t>
-            </a:r>
-            <a:endParaRPr lang="en-US" dirty="0"/>
-          </a:p>
-        </p:txBody>
-      </p:sp>
-      <p:sp>
-        <p:nvSpPr>
-          <p:cNvPr id="13" name="Content Placeholder 12"/>
-          <p:cNvSpPr>
-            <a:spLocks noGrp="1"/>
-          </p:cNvSpPr>
-          <p:nvPr>
-            <p:ph sz="quarter" idx="14"/>
-          </p:nvPr>
-        </p:nvSpPr>
-        <p:spPr>
-          <a:xfrm>
-            <a:off x="4648200" y="2819400"/>
-            <a:ext cx="3124200" cy="2743200"/>
-          </a:xfrm>
-        </p:spPr>
-        <p:txBody>
-          <a:bodyPr/>
-          <a:lstStyle/>
-          <a:p>
-            <a:pPr lvl="0"/>
-            <a:r>
-              <a:rPr lang="en-US" smtClean="0"/>
-              <a:t>Click to edit Master text styles</a:t>
-            </a:r>
-          </a:p>
-          <a:p>
-            <a:pPr lvl="1"/>
-            <a:r>
-              <a:rPr lang="en-US" smtClean="0"/>
-              <a:t>Second level</a:t>
-            </a:r>
-          </a:p>
-          <a:p>
-            <a:pPr lvl="2"/>
-            <a:r>
-              <a:rPr lang="en-US" smtClean="0"/>
-              <a:t>Third level</a:t>
-            </a:r>
-          </a:p>
-          <a:p>
-            <a:pPr lvl="3"/>
-            <a:r>
-              <a:rPr lang="en-US" smtClean="0"/>
-              <a:t>Fourth level</a:t>
-            </a:r>
-          </a:p>
-          <a:p>
-            <a:pPr lvl="4"/>
-            <a:r>
-              <a:rPr lang="en-US" smtClean="0"/>
-              <a:t>Fifth level</a:t>
-            </a:r>
-            <a:endParaRPr lang="en-US" dirty="0"/>
-          </a:p>
-        </p:txBody>
-      </p:sp>
       <p:sp>
         <p:nvSpPr>
           <p:cNvPr id="2" name="Title 1"/>
@@ -1687,7 +1431,7 @@
               <a:rPr lang="en-US" smtClean="0"/>
               <a:t>Click to edit Master title style</a:t>
             </a:r>
-            <a:endParaRPr lang="en-US"/>
+            <a:endParaRPr lang="en-GB"/>
           </a:p>
         </p:txBody>
       </p:sp>
@@ -1703,16 +1447,16 @@
         </p:nvSpPr>
         <p:spPr>
           <a:xfrm>
-            <a:off x="1371600" y="2362201"/>
-            <a:ext cx="3125788" cy="451338"/>
+            <a:off x="457200" y="1535113"/>
+            <a:ext cx="4040188" cy="639762"/>
           </a:xfrm>
         </p:spPr>
         <p:txBody>
           <a:bodyPr anchor="b"/>
           <a:lstStyle>
-            <a:lvl1pPr marL="0" indent="0" algn="ctr">
-              <a:buNone/>
-              <a:defRPr sz="1800" b="1" baseline="0"/>
+            <a:lvl1pPr marL="0" indent="0">
+              <a:buNone/>
+              <a:defRPr sz="2400" b="1"/>
             </a:lvl1pPr>
             <a:lvl2pPr marL="457200" indent="0">
               <a:buNone/>
@@ -1758,26 +1502,111 @@
       </p:sp>
       <p:sp>
         <p:nvSpPr>
-          <p:cNvPr id="5" name="Text Placeholder 4"/>
-          <p:cNvSpPr>
-            <a:spLocks noGrp="1"/>
-          </p:cNvSpPr>
-          <p:nvPr>
-            <p:ph type="body" sz="quarter" idx="3"/>
+          <p:cNvPr id="4" name="Content Placeholder 3"/>
+          <p:cNvSpPr>
+            <a:spLocks noGrp="1"/>
+          </p:cNvSpPr>
+          <p:nvPr>
+            <p:ph sz="half" idx="2"/>
           </p:nvPr>
         </p:nvSpPr>
         <p:spPr>
           <a:xfrm>
-            <a:off x="4645025" y="2359152"/>
-            <a:ext cx="3127375" cy="448056"/>
+            <a:off x="457200" y="2174875"/>
+            <a:ext cx="4040188" cy="3951288"/>
           </a:xfrm>
         </p:spPr>
         <p:txBody>
+          <a:bodyPr/>
+          <a:lstStyle>
+            <a:lvl1pPr>
+              <a:defRPr sz="2400"/>
+            </a:lvl1pPr>
+            <a:lvl2pPr>
+              <a:defRPr sz="2000"/>
+            </a:lvl2pPr>
+            <a:lvl3pPr>
+              <a:defRPr sz="1800"/>
+            </a:lvl3pPr>
+            <a:lvl4pPr>
+              <a:defRPr sz="1600"/>
+            </a:lvl4pPr>
+            <a:lvl5pPr>
+              <a:defRPr sz="1600"/>
+            </a:lvl5pPr>
+            <a:lvl6pPr>
+              <a:defRPr sz="1600"/>
+            </a:lvl6pPr>
+            <a:lvl7pPr>
+              <a:defRPr sz="1600"/>
+            </a:lvl7pPr>
+            <a:lvl8pPr>
+              <a:defRPr sz="1600"/>
+            </a:lvl8pPr>
+            <a:lvl9pPr>
+              <a:defRPr sz="1600"/>
+            </a:lvl9pPr>
+          </a:lstStyle>
+          <a:p>
+            <a:pPr lvl="0"/>
+            <a:r>
+              <a:rPr lang="en-US" smtClean="0"/>
+              <a:t>Click to edit Master text styles</a:t>
+            </a:r>
+          </a:p>
+          <a:p>
+            <a:pPr lvl="1"/>
+            <a:r>
+              <a:rPr lang="en-US" smtClean="0"/>
+              <a:t>Second level</a:t>
+            </a:r>
+          </a:p>
+          <a:p>
+            <a:pPr lvl="2"/>
+            <a:r>
+              <a:rPr lang="en-US" smtClean="0"/>
+              <a:t>Third level</a:t>
+            </a:r>
+          </a:p>
+          <a:p>
+            <a:pPr lvl="3"/>
+            <a:r>
+              <a:rPr lang="en-US" smtClean="0"/>
+              <a:t>Fourth level</a:t>
+            </a:r>
+          </a:p>
+          <a:p>
+            <a:pPr lvl="4"/>
+            <a:r>
+              <a:rPr lang="en-US" smtClean="0"/>
+              <a:t>Fifth level</a:t>
+            </a:r>
+            <a:endParaRPr lang="en-GB"/>
+          </a:p>
+        </p:txBody>
+      </p:sp>
+      <p:sp>
+        <p:nvSpPr>
+          <p:cNvPr id="5" name="Text Placeholder 4"/>
+          <p:cNvSpPr>
+            <a:spLocks noGrp="1"/>
+          </p:cNvSpPr>
+          <p:nvPr>
+            <p:ph type="body" sz="quarter" idx="3"/>
+          </p:nvPr>
+        </p:nvSpPr>
+        <p:spPr>
+          <a:xfrm>
+            <a:off x="4645025" y="1535113"/>
+            <a:ext cx="4041775" cy="639762"/>
+          </a:xfrm>
+        </p:spPr>
+        <p:txBody>
           <a:bodyPr anchor="b"/>
           <a:lstStyle>
-            <a:lvl1pPr marL="0" indent="0" algn="ctr">
-              <a:buNone/>
-              <a:defRPr sz="1800" b="1" baseline="0"/>
+            <a:lvl1pPr marL="0" indent="0">
+              <a:buNone/>
+              <a:defRPr sz="2400" b="1"/>
             </a:lvl1pPr>
             <a:lvl2pPr marL="457200" indent="0">
               <a:buNone/>
@@ -1823,6 +1652,91 @@
       </p:sp>
       <p:sp>
         <p:nvSpPr>
+          <p:cNvPr id="6" name="Content Placeholder 5"/>
+          <p:cNvSpPr>
+            <a:spLocks noGrp="1"/>
+          </p:cNvSpPr>
+          <p:nvPr>
+            <p:ph sz="quarter" idx="4"/>
+          </p:nvPr>
+        </p:nvSpPr>
+        <p:spPr>
+          <a:xfrm>
+            <a:off x="4645025" y="2174875"/>
+            <a:ext cx="4041775" cy="3951288"/>
+          </a:xfrm>
+        </p:spPr>
+        <p:txBody>
+          <a:bodyPr/>
+          <a:lstStyle>
+            <a:lvl1pPr>
+              <a:defRPr sz="2400"/>
+            </a:lvl1pPr>
+            <a:lvl2pPr>
+              <a:defRPr sz="2000"/>
+            </a:lvl2pPr>
+            <a:lvl3pPr>
+              <a:defRPr sz="1800"/>
+            </a:lvl3pPr>
+            <a:lvl4pPr>
+              <a:defRPr sz="1600"/>
+            </a:lvl4pPr>
+            <a:lvl5pPr>
+              <a:defRPr sz="1600"/>
+            </a:lvl5pPr>
+            <a:lvl6pPr>
+              <a:defRPr sz="1600"/>
+            </a:lvl6pPr>
+            <a:lvl7pPr>
+              <a:defRPr sz="1600"/>
+            </a:lvl7pPr>
+            <a:lvl8pPr>
+              <a:defRPr sz="1600"/>
+            </a:lvl8pPr>
+            <a:lvl9pPr>
+              <a:defRPr sz="1600"/>
+            </a:lvl9pPr>
+          </a:lstStyle>
+          <a:p>
+            <a:pPr lvl="0"/>
+            <a:r>
+              <a:rPr lang="en-US" smtClean="0"/>
+              <a:t>Click to edit Master text styles</a:t>
+            </a:r>
+          </a:p>
+          <a:p>
+            <a:pPr lvl="1"/>
+            <a:r>
+              <a:rPr lang="en-US" smtClean="0"/>
+              <a:t>Second level</a:t>
+            </a:r>
+          </a:p>
+          <a:p>
+            <a:pPr lvl="2"/>
+            <a:r>
+              <a:rPr lang="en-US" smtClean="0"/>
+              <a:t>Third level</a:t>
+            </a:r>
+          </a:p>
+          <a:p>
+            <a:pPr lvl="3"/>
+            <a:r>
+              <a:rPr lang="en-US" smtClean="0"/>
+              <a:t>Fourth level</a:t>
+            </a:r>
+          </a:p>
+          <a:p>
+            <a:pPr lvl="4"/>
+            <a:r>
+              <a:rPr lang="en-US" smtClean="0"/>
+              <a:t>Fifth level</a:t>
+            </a:r>
+            <a:endParaRPr lang="en-GB"/>
+          </a:p>
+        </p:txBody>
+      </p:sp>
+      <p:sp>
+        <p:nvSpPr>
           <p:cNvPr id="7" name="Date Placeholder 6"/>
           <p:cNvSpPr>
             <a:spLocks noGrp="1"/>
@@ -1838,7 +1752,8 @@
           <a:p>
             <a:fld id="{7F97EE62-E3D0-4E7B-B469-EAEE700658EE}" type="datetimeFigureOut">
               <a:rPr lang="en-GB" smtClean="0"/>
-              <a:t>16/02/2012</a:t>
+              <a:pPr/>
+              <a:t>19/02/2012</a:t>
             </a:fld>
             <a:endParaRPr lang="en-GB"/>
           </a:p>
@@ -1880,6 +1795,7 @@
           <a:p>
             <a:fld id="{5D8511BD-094F-4FD0-B9E7-C347FC64F4DF}" type="slidenum">
               <a:rPr lang="en-GB" smtClean="0"/>
+              <a:pPr/>
               <a:t>‹#›</a:t>
             </a:fld>
             <a:endParaRPr lang="en-GB"/>
@@ -1930,7 +1846,7 @@
               <a:rPr lang="en-US" smtClean="0"/>
               <a:t>Click to edit Master title style</a:t>
             </a:r>
-            <a:endParaRPr lang="en-US"/>
+            <a:endParaRPr lang="en-GB"/>
           </a:p>
         </p:txBody>
       </p:sp>
@@ -1951,7 +1867,8 @@
           <a:p>
             <a:fld id="{7F97EE62-E3D0-4E7B-B469-EAEE700658EE}" type="datetimeFigureOut">
               <a:rPr lang="en-GB" smtClean="0"/>
-              <a:t>16/02/2012</a:t>
+              <a:pPr/>
+              <a:t>19/02/2012</a:t>
             </a:fld>
             <a:endParaRPr lang="en-GB"/>
           </a:p>
@@ -1993,45 +1910,13 @@
           <a:p>
             <a:fld id="{5D8511BD-094F-4FD0-B9E7-C347FC64F4DF}" type="slidenum">
               <a:rPr lang="en-GB" smtClean="0"/>
+              <a:pPr/>
               <a:t>‹#›</a:t>
             </a:fld>
             <a:endParaRPr lang="en-GB"/>
           </a:p>
         </p:txBody>
       </p:sp>
-      <p:pic>
-        <p:nvPicPr>
-          <p:cNvPr id="7" name="Picture 6" descr="flourish2.png"/>
-          <p:cNvPicPr>
-            <a:picLocks noChangeAspect="1"/>
-          </p:cNvPicPr>
-          <p:nvPr/>
-        </p:nvPicPr>
-        <p:blipFill>
-          <a:blip r:embed="rId2">
-            <a:duotone>
-              <a:prstClr val="black"/>
-              <a:schemeClr val="tx2">
-                <a:tint val="45000"/>
-                <a:satMod val="400000"/>
-              </a:schemeClr>
-            </a:duotone>
-            <a:lum bright="-14000"/>
-          </a:blip>
-          <a:stretch>
-            <a:fillRect/>
-          </a:stretch>
-        </p:blipFill>
-        <p:spPr>
-          <a:xfrm>
-            <a:off x="0" y="1618488"/>
-            <a:ext cx="9144000" cy="932688"/>
-          </a:xfrm>
-          <a:prstGeom prst="rect">
-            <a:avLst/>
-          </a:prstGeom>
-        </p:spPr>
-      </p:pic>
     </p:spTree>
   </p:cSld>
   <p:clrMapOvr>
@@ -2059,7 +1944,7 @@
       </p:grpSpPr>
       <p:sp>
         <p:nvSpPr>
-          <p:cNvPr id="5" name="Date Placeholder 4"/>
+          <p:cNvPr id="2" name="Date Placeholder 1"/>
           <p:cNvSpPr>
             <a:spLocks noGrp="1"/>
           </p:cNvSpPr>
@@ -2074,7 +1959,8 @@
           <a:p>
             <a:fld id="{7F97EE62-E3D0-4E7B-B469-EAEE700658EE}" type="datetimeFigureOut">
               <a:rPr lang="en-GB" smtClean="0"/>
-              <a:t>16/02/2012</a:t>
+              <a:pPr/>
+              <a:t>19/02/2012</a:t>
             </a:fld>
             <a:endParaRPr lang="en-GB"/>
           </a:p>
@@ -2082,7 +1968,7 @@
       </p:sp>
       <p:sp>
         <p:nvSpPr>
-          <p:cNvPr id="6" name="Footer Placeholder 5"/>
+          <p:cNvPr id="3" name="Footer Placeholder 2"/>
           <p:cNvSpPr>
             <a:spLocks noGrp="1"/>
           </p:cNvSpPr>
@@ -2101,7 +1987,7 @@
       </p:sp>
       <p:sp>
         <p:nvSpPr>
-          <p:cNvPr id="7" name="Slide Number Placeholder 6"/>
+          <p:cNvPr id="4" name="Slide Number Placeholder 3"/>
           <p:cNvSpPr>
             <a:spLocks noGrp="1"/>
           </p:cNvSpPr>
@@ -2116,6 +2002,7 @@
           <a:p>
             <a:fld id="{5D8511BD-094F-4FD0-B9E7-C347FC64F4DF}" type="slidenum">
               <a:rPr lang="en-GB" smtClean="0"/>
+              <a:pPr/>
               <a:t>‹#›</a:t>
             </a:fld>
             <a:endParaRPr lang="en-GB"/>
@@ -2159,17 +2046,15 @@
         </p:nvSpPr>
         <p:spPr>
           <a:xfrm>
-            <a:off x="4953001" y="1676400"/>
-            <a:ext cx="2819399" cy="599440"/>
+            <a:off x="457200" y="273050"/>
+            <a:ext cx="3008313" cy="1162050"/>
           </a:xfrm>
         </p:spPr>
         <p:txBody>
-          <a:bodyPr anchor="b">
-            <a:noAutofit/>
-          </a:bodyPr>
+          <a:bodyPr anchor="b"/>
           <a:lstStyle>
-            <a:lvl1pPr algn="ctr">
-              <a:defRPr sz="1700" b="1" cap="all" spc="0" baseline="0"/>
+            <a:lvl1pPr algn="l">
+              <a:defRPr sz="2000" b="1"/>
             </a:lvl1pPr>
           </a:lstStyle>
           <a:p>
@@ -2177,30 +2062,115 @@
               <a:rPr lang="en-US" smtClean="0"/>
               <a:t>Click to edit Master title style</a:t>
             </a:r>
-            <a:endParaRPr lang="en-US" dirty="0"/>
-          </a:p>
-        </p:txBody>
-      </p:sp>
-      <p:sp>
-        <p:nvSpPr>
-          <p:cNvPr id="4" name="Text Placeholder 3"/>
-          <p:cNvSpPr>
-            <a:spLocks noGrp="1"/>
-          </p:cNvSpPr>
-          <p:nvPr>
-            <p:ph type="body" sz="half" idx="2"/>
+            <a:endParaRPr lang="en-GB"/>
+          </a:p>
+        </p:txBody>
+      </p:sp>
+      <p:sp>
+        <p:nvSpPr>
+          <p:cNvPr id="3" name="Content Placeholder 2"/>
+          <p:cNvSpPr>
+            <a:spLocks noGrp="1"/>
+          </p:cNvSpPr>
+          <p:nvPr>
+            <p:ph idx="1"/>
           </p:nvPr>
         </p:nvSpPr>
         <p:spPr>
           <a:xfrm>
-            <a:off x="4953001" y="2275840"/>
-            <a:ext cx="2819399" cy="2905760"/>
+            <a:off x="3575050" y="273050"/>
+            <a:ext cx="5111750" cy="5853113"/>
           </a:xfrm>
         </p:spPr>
         <p:txBody>
           <a:bodyPr/>
           <a:lstStyle>
-            <a:lvl1pPr marL="0" indent="0" algn="ctr">
+            <a:lvl1pPr>
+              <a:defRPr sz="3200"/>
+            </a:lvl1pPr>
+            <a:lvl2pPr>
+              <a:defRPr sz="2800"/>
+            </a:lvl2pPr>
+            <a:lvl3pPr>
+              <a:defRPr sz="2400"/>
+            </a:lvl3pPr>
+            <a:lvl4pPr>
+              <a:defRPr sz="2000"/>
+            </a:lvl4pPr>
+            <a:lvl5pPr>
+              <a:defRPr sz="2000"/>
+            </a:lvl5pPr>
+            <a:lvl6pPr>
+              <a:defRPr sz="2000"/>
+            </a:lvl6pPr>
+            <a:lvl7pPr>
+              <a:defRPr sz="2000"/>
+            </a:lvl7pPr>
+            <a:lvl8pPr>
+              <a:defRPr sz="2000"/>
+            </a:lvl8pPr>
+            <a:lvl9pPr>
+              <a:defRPr sz="2000"/>
+            </a:lvl9pPr>
+          </a:lstStyle>
+          <a:p>
+            <a:pPr lvl="0"/>
+            <a:r>
+              <a:rPr lang="en-US" smtClean="0"/>
+              <a:t>Click to edit Master text styles</a:t>
+            </a:r>
+          </a:p>
+          <a:p>
+            <a:pPr lvl="1"/>
+            <a:r>
+              <a:rPr lang="en-US" smtClean="0"/>
+              <a:t>Second level</a:t>
+            </a:r>
+          </a:p>
+          <a:p>
+            <a:pPr lvl="2"/>
+            <a:r>
+              <a:rPr lang="en-US" smtClean="0"/>
+              <a:t>Third level</a:t>
+            </a:r>
+          </a:p>
+          <a:p>
+            <a:pPr lvl="3"/>
+            <a:r>
+              <a:rPr lang="en-US" smtClean="0"/>
+              <a:t>Fourth level</a:t>
+            </a:r>
+          </a:p>
+          <a:p>
+            <a:pPr lvl="4"/>
+            <a:r>
+              <a:rPr lang="en-US" smtClean="0"/>
+              <a:t>Fifth level</a:t>
+            </a:r>
+            <a:endParaRPr lang="en-GB"/>
+          </a:p>
+        </p:txBody>
+      </p:sp>
+      <p:sp>
+        <p:nvSpPr>
+          <p:cNvPr id="4" name="Text Placeholder 3"/>
+          <p:cNvSpPr>
+            <a:spLocks noGrp="1"/>
+          </p:cNvSpPr>
+          <p:nvPr>
+            <p:ph type="body" sz="half" idx="2"/>
+          </p:nvPr>
+        </p:nvSpPr>
+        <p:spPr>
+          <a:xfrm>
+            <a:off x="457200" y="1435100"/>
+            <a:ext cx="3008313" cy="4691063"/>
+          </a:xfrm>
+        </p:spPr>
+        <p:txBody>
+          <a:bodyPr/>
+          <a:lstStyle>
+            <a:lvl1pPr marL="0" indent="0">
               <a:buNone/>
               <a:defRPr sz="1400"/>
             </a:lvl1pPr>
@@ -2263,7 +2233,8 @@
           <a:p>
             <a:fld id="{7F97EE62-E3D0-4E7B-B469-EAEE700658EE}" type="datetimeFigureOut">
               <a:rPr lang="en-GB" smtClean="0"/>
-              <a:t>16/02/2012</a:t>
+              <a:pPr/>
+              <a:t>19/02/2012</a:t>
             </a:fld>
             <a:endParaRPr lang="en-GB"/>
           </a:p>
@@ -2305,66 +2276,10 @@
           <a:p>
             <a:fld id="{5D8511BD-094F-4FD0-B9E7-C347FC64F4DF}" type="slidenum">
               <a:rPr lang="en-GB" smtClean="0"/>
+              <a:pPr/>
               <a:t>‹#›</a:t>
             </a:fld>
             <a:endParaRPr lang="en-GB"/>
-          </a:p>
-        </p:txBody>
-      </p:sp>
-      <p:sp>
-        <p:nvSpPr>
-          <p:cNvPr id="9" name="Content Placeholder 8"/>
-          <p:cNvSpPr>
-            <a:spLocks noGrp="1"/>
-          </p:cNvSpPr>
-          <p:nvPr>
-            <p:ph sz="quarter" idx="13"/>
-          </p:nvPr>
-        </p:nvSpPr>
-        <p:spPr>
-          <a:xfrm>
-            <a:off x="1371600" y="1676400"/>
-            <a:ext cx="3276600" cy="3505200"/>
-          </a:xfrm>
-        </p:spPr>
-        <p:txBody>
-          <a:bodyPr/>
-          <a:lstStyle/>
-          <a:p>
-            <a:pPr lvl="0"/>
-            <a:r>
-              <a:rPr lang="en-US" smtClean="0"/>
-              <a:t>Click to edit Master text styles</a:t>
-            </a:r>
-          </a:p>
-          <a:p>
-            <a:pPr lvl="1"/>
-            <a:r>
-              <a:rPr lang="en-US" smtClean="0"/>
-              <a:t>Second level</a:t>
-            </a:r>
-          </a:p>
-          <a:p>
-            <a:pPr lvl="2"/>
-            <a:r>
-              <a:rPr lang="en-US" smtClean="0"/>
-              <a:t>Third level</a:t>
-            </a:r>
-          </a:p>
-          <a:p>
-            <a:pPr lvl="3"/>
-            <a:r>
-              <a:rPr lang="en-US" smtClean="0"/>
-              <a:t>Fourth level</a:t>
-            </a:r>
-          </a:p>
-          <a:p>
-            <a:pPr lvl="4"/>
-            <a:r>
-              <a:rPr lang="en-US" smtClean="0"/>
-              <a:t>Fifth level</a:t>
-            </a:r>
-            <a:endParaRPr lang="en-US" dirty="0"/>
           </a:p>
         </p:txBody>
       </p:sp>
@@ -2395,132 +2310,58 @@
       </p:grpSpPr>
       <p:sp>
         <p:nvSpPr>
-          <p:cNvPr id="10" name="Plaque 9"/>
-          <p:cNvSpPr/>
-          <p:nvPr/>
+          <p:cNvPr id="2" name="Title 1"/>
+          <p:cNvSpPr>
+            <a:spLocks noGrp="1"/>
+          </p:cNvSpPr>
+          <p:nvPr>
+            <p:ph type="title"/>
+          </p:nvPr>
         </p:nvSpPr>
         <p:spPr>
           <a:xfrm>
-            <a:off x="1463040" y="1847088"/>
-            <a:ext cx="3090672" cy="3090672"/>
+            <a:off x="1792288" y="4800600"/>
+            <a:ext cx="5486400" cy="566738"/>
           </a:xfrm>
-          <a:prstGeom prst="plaque">
-            <a:avLst>
-              <a:gd name="adj" fmla="val 8438"/>
-            </a:avLst>
-          </a:prstGeom>
-          <a:noFill/>
-          <a:ln w="9525">
-            <a:solidFill>
-              <a:schemeClr val="tx2">
-                <a:alpha val="17000"/>
-              </a:schemeClr>
-            </a:solidFill>
-            <a:miter lim="800000"/>
-          </a:ln>
         </p:spPr>
-        <p:style>
-          <a:lnRef idx="2">
-            <a:schemeClr val="accent1">
-              <a:shade val="50000"/>
-            </a:schemeClr>
-          </a:lnRef>
-          <a:fillRef idx="1">
-            <a:schemeClr val="accent1"/>
-          </a:fillRef>
-          <a:effectRef idx="0">
-            <a:schemeClr val="accent1"/>
-          </a:effectRef>
-          <a:fontRef idx="minor">
-            <a:schemeClr val="lt1"/>
-          </a:fontRef>
-        </p:style>
-        <p:txBody>
-          <a:bodyPr rtlCol="0" anchor="ctr"/>
-          <a:lstStyle/>
-          <a:p>
-            <a:pPr algn="ctr"/>
-            <a:endParaRPr lang="en-US"/>
-          </a:p>
-        </p:txBody>
-      </p:sp>
-      <p:sp>
-        <p:nvSpPr>
-          <p:cNvPr id="2" name="Title 1"/>
-          <p:cNvSpPr>
-            <a:spLocks noGrp="1"/>
-          </p:cNvSpPr>
-          <p:nvPr>
-            <p:ph type="title"/>
+        <p:txBody>
+          <a:bodyPr anchor="b"/>
+          <a:lstStyle>
+            <a:lvl1pPr algn="l">
+              <a:defRPr sz="2000" b="1"/>
+            </a:lvl1pPr>
+          </a:lstStyle>
+          <a:p>
+            <a:r>
+              <a:rPr lang="en-US" smtClean="0"/>
+              <a:t>Click to edit Master title style</a:t>
+            </a:r>
+            <a:endParaRPr lang="en-GB"/>
+          </a:p>
+        </p:txBody>
+      </p:sp>
+      <p:sp>
+        <p:nvSpPr>
+          <p:cNvPr id="3" name="Picture Placeholder 2"/>
+          <p:cNvSpPr>
+            <a:spLocks noGrp="1"/>
+          </p:cNvSpPr>
+          <p:nvPr>
+            <p:ph type="pic" idx="1"/>
           </p:nvPr>
         </p:nvSpPr>
         <p:spPr>
           <a:xfrm>
-            <a:off x="4953000" y="1676400"/>
-            <a:ext cx="2819400" cy="599440"/>
+            <a:off x="1792288" y="612775"/>
+            <a:ext cx="5486400" cy="4114800"/>
           </a:xfrm>
         </p:spPr>
         <p:txBody>
-          <a:bodyPr anchor="b">
-            <a:noAutofit/>
-          </a:bodyPr>
+          <a:bodyPr/>
           <a:lstStyle>
-            <a:lvl1pPr algn="ctr">
-              <a:defRPr sz="1700" b="1" cap="all" spc="0" baseline="0"/>
-            </a:lvl1pPr>
-          </a:lstStyle>
-          <a:p>
-            <a:r>
-              <a:rPr lang="en-US" smtClean="0"/>
-              <a:t>Click to edit Master title style</a:t>
-            </a:r>
-            <a:endParaRPr lang="en-US" dirty="0"/>
-          </a:p>
-        </p:txBody>
-      </p:sp>
-      <p:sp>
-        <p:nvSpPr>
-          <p:cNvPr id="3" name="Picture Placeholder 2"/>
-          <p:cNvSpPr>
-            <a:spLocks noGrp="1"/>
-          </p:cNvSpPr>
-          <p:nvPr>
-            <p:ph type="pic" idx="1"/>
-          </p:nvPr>
-        </p:nvSpPr>
-        <p:spPr>
-          <a:xfrm>
-            <a:off x="1524000" y="1905000"/>
-            <a:ext cx="2971800" cy="2971800"/>
-          </a:xfrm>
-          <a:prstGeom prst="plaque">
-            <a:avLst>
-              <a:gd name="adj" fmla="val 8341"/>
-            </a:avLst>
-          </a:prstGeom>
-          <a:solidFill>
-            <a:schemeClr val="bg1">
-              <a:lumMod val="95000"/>
-              <a:alpha val="35000"/>
-            </a:schemeClr>
-          </a:solidFill>
-          <a:ln w="98425" cmpd="thinThick">
-            <a:noFill/>
-            <a:bevel/>
-          </a:ln>
-        </p:spPr>
-        <p:txBody>
-          <a:bodyPr>
-            <a:normAutofit/>
-          </a:bodyPr>
-          <a:lstStyle>
-            <a:lvl1pPr marL="0" indent="0" algn="ctr">
-              <a:buNone/>
-              <a:defRPr sz="1800" baseline="0">
-                <a:solidFill>
-                  <a:schemeClr val="tx2"/>
-                </a:solidFill>
-              </a:defRPr>
+            <a:lvl1pPr marL="0" indent="0">
+              <a:buNone/>
+              <a:defRPr sz="3200"/>
             </a:lvl1pPr>
             <a:lvl2pPr marL="457200" indent="0">
               <a:buNone/>
@@ -2556,11 +2397,7 @@
             </a:lvl9pPr>
           </a:lstStyle>
           <a:p>
-            <a:r>
-              <a:rPr lang="en-US" smtClean="0"/>
-              <a:t>Click icon to add picture</a:t>
-            </a:r>
-            <a:endParaRPr lang="en-US" dirty="0"/>
+            <a:endParaRPr lang="en-GB"/>
           </a:p>
         </p:txBody>
       </p:sp>
@@ -2576,14 +2413,14 @@
         </p:nvSpPr>
         <p:spPr>
           <a:xfrm>
-            <a:off x="4953000" y="2276856"/>
-            <a:ext cx="2819400" cy="2875280"/>
+            <a:off x="1792288" y="5367338"/>
+            <a:ext cx="5486400" cy="804862"/>
           </a:xfrm>
         </p:spPr>
         <p:txBody>
           <a:bodyPr/>
           <a:lstStyle>
-            <a:lvl1pPr marL="0" indent="0" algn="ctr">
+            <a:lvl1pPr marL="0" indent="0">
               <a:buNone/>
               <a:defRPr sz="1400"/>
             </a:lvl1pPr>
@@ -2646,7 +2483,8 @@
           <a:p>
             <a:fld id="{7F97EE62-E3D0-4E7B-B469-EAEE700658EE}" type="datetimeFigureOut">
               <a:rPr lang="en-GB" smtClean="0"/>
-              <a:t>16/02/2012</a:t>
+              <a:pPr/>
+              <a:t>19/02/2012</a:t>
             </a:fld>
             <a:endParaRPr lang="en-GB"/>
           </a:p>
@@ -2688,6 +2526,7 @@
           <a:p>
             <a:fld id="{5D8511BD-094F-4FD0-B9E7-C347FC64F4DF}" type="slidenum">
               <a:rPr lang="en-GB" smtClean="0"/>
+              <a:pPr/>
               <a:t>‹#›</a:t>
             </a:fld>
             <a:endParaRPr lang="en-GB"/>
@@ -2724,83 +2563,59 @@
           <a:chExt cx="0" cy="0"/>
         </a:xfrm>
       </p:grpSpPr>
-      <p:pic>
-        <p:nvPicPr>
-          <p:cNvPr id="8" name="Picture 7" descr="window3.png"/>
-          <p:cNvPicPr>
-            <a:picLocks noChangeAspect="1"/>
-          </p:cNvPicPr>
-          <p:nvPr/>
-        </p:nvPicPr>
-        <p:blipFill>
-          <a:blip r:embed="rId13"/>
-          <a:stretch>
-            <a:fillRect/>
-          </a:stretch>
-        </p:blipFill>
+      <p:sp>
+        <p:nvSpPr>
+          <p:cNvPr id="2" name="Title Placeholder 1"/>
+          <p:cNvSpPr>
+            <a:spLocks noGrp="1"/>
+          </p:cNvSpPr>
+          <p:nvPr>
+            <p:ph type="title"/>
+          </p:nvPr>
+        </p:nvSpPr>
         <p:spPr>
           <a:xfrm>
-            <a:off x="0" y="0"/>
-            <a:ext cx="9144000" cy="6858000"/>
+            <a:off x="457200" y="274638"/>
+            <a:ext cx="8229600" cy="1143000"/>
           </a:xfrm>
           <a:prstGeom prst="rect">
             <a:avLst/>
           </a:prstGeom>
         </p:spPr>
-      </p:pic>
-      <p:sp>
-        <p:nvSpPr>
-          <p:cNvPr id="2" name="Title Placeholder 1"/>
-          <p:cNvSpPr>
-            <a:spLocks noGrp="1"/>
-          </p:cNvSpPr>
-          <p:nvPr>
-            <p:ph type="title"/>
+        <p:txBody>
+          <a:bodyPr vert="horz" lIns="91440" tIns="45720" rIns="91440" bIns="45720" rtlCol="0" anchor="ctr">
+            <a:normAutofit/>
+          </a:bodyPr>
+          <a:lstStyle/>
+          <a:p>
+            <a:r>
+              <a:rPr lang="en-US" smtClean="0"/>
+              <a:t>Click to edit Master title style</a:t>
+            </a:r>
+            <a:endParaRPr lang="en-GB"/>
+          </a:p>
+        </p:txBody>
+      </p:sp>
+      <p:sp>
+        <p:nvSpPr>
+          <p:cNvPr id="3" name="Text Placeholder 2"/>
+          <p:cNvSpPr>
+            <a:spLocks noGrp="1"/>
+          </p:cNvSpPr>
+          <p:nvPr>
+            <p:ph type="body" idx="1"/>
           </p:nvPr>
         </p:nvSpPr>
         <p:spPr>
           <a:xfrm>
-            <a:off x="1371600" y="1295400"/>
-            <a:ext cx="6400800" cy="685800"/>
+            <a:off x="457200" y="1600200"/>
+            <a:ext cx="8229600" cy="4525963"/>
           </a:xfrm>
           <a:prstGeom prst="rect">
             <a:avLst/>
           </a:prstGeom>
         </p:spPr>
         <p:txBody>
-          <a:bodyPr vert="horz" lIns="91440" tIns="45720" rIns="91440" bIns="45720" rtlCol="0" anchor="b" anchorCtr="0">
-            <a:normAutofit/>
-          </a:bodyPr>
-          <a:lstStyle/>
-          <a:p>
-            <a:r>
-              <a:rPr lang="en-US" smtClean="0"/>
-              <a:t>Click to edit Master title style</a:t>
-            </a:r>
-            <a:endParaRPr lang="en-US" dirty="0"/>
-          </a:p>
-        </p:txBody>
-      </p:sp>
-      <p:sp>
-        <p:nvSpPr>
-          <p:cNvPr id="3" name="Text Placeholder 2"/>
-          <p:cNvSpPr>
-            <a:spLocks noGrp="1"/>
-          </p:cNvSpPr>
-          <p:nvPr>
-            <p:ph type="body" idx="1"/>
-          </p:nvPr>
-        </p:nvSpPr>
-        <p:spPr>
-          <a:xfrm>
-            <a:off x="1371600" y="2057400"/>
-            <a:ext cx="6400800" cy="3429001"/>
-          </a:xfrm>
-          <a:prstGeom prst="rect">
-            <a:avLst/>
-          </a:prstGeom>
-        </p:spPr>
-        <p:txBody>
           <a:bodyPr vert="horz" lIns="91440" tIns="45720" rIns="91440" bIns="45720" rtlCol="0">
             <a:normAutofit/>
           </a:bodyPr>
@@ -2839,7 +2654,7 @@
               <a:rPr lang="en-US" smtClean="0"/>
               <a:t>Fifth level</a:t>
             </a:r>
-            <a:endParaRPr lang="en-US" dirty="0"/>
+            <a:endParaRPr lang="en-GB"/>
           </a:p>
         </p:txBody>
       </p:sp>
@@ -2853,92 +2668,9 @@
             <p:ph type="dt" sz="half" idx="2"/>
           </p:nvPr>
         </p:nvSpPr>
-        <p:spPr bwMode="white">
+        <p:spPr>
           <a:xfrm>
-            <a:off x="304800" y="6356350"/>
-            <a:ext cx="2133600" cy="365125"/>
-          </a:xfrm>
-          <a:prstGeom prst="rect">
-            <a:avLst/>
-          </a:prstGeom>
-          <a:ln>
-            <a:noFill/>
-          </a:ln>
-        </p:spPr>
-        <p:txBody>
-          <a:bodyPr vert="horz" lIns="91440" tIns="45720" rIns="91440" bIns="45720" rtlCol="0" anchor="ctr"/>
-          <a:lstStyle>
-            <a:lvl1pPr algn="l">
-              <a:defRPr sz="1100" baseline="0">
-                <a:solidFill>
-                  <a:schemeClr val="accent1">
-                    <a:lumMod val="60000"/>
-                    <a:lumOff val="40000"/>
-                  </a:schemeClr>
-                </a:solidFill>
-              </a:defRPr>
-            </a:lvl1pPr>
-          </a:lstStyle>
-          <a:p>
-            <a:fld id="{7F97EE62-E3D0-4E7B-B469-EAEE700658EE}" type="datetimeFigureOut">
-              <a:rPr lang="en-GB" smtClean="0"/>
-              <a:t>16/02/2012</a:t>
-            </a:fld>
-            <a:endParaRPr lang="en-GB"/>
-          </a:p>
-        </p:txBody>
-      </p:sp>
-      <p:sp>
-        <p:nvSpPr>
-          <p:cNvPr id="5" name="Footer Placeholder 4"/>
-          <p:cNvSpPr>
-            <a:spLocks noGrp="1"/>
-          </p:cNvSpPr>
-          <p:nvPr>
-            <p:ph type="ftr" sz="quarter" idx="3"/>
-          </p:nvPr>
-        </p:nvSpPr>
-        <p:spPr bwMode="white">
-          <a:xfrm>
-            <a:off x="2971800" y="6356350"/>
-            <a:ext cx="3200400" cy="365125"/>
-          </a:xfrm>
-          <a:prstGeom prst="rect">
-            <a:avLst/>
-          </a:prstGeom>
-        </p:spPr>
-        <p:txBody>
-          <a:bodyPr vert="horz" lIns="91440" tIns="45720" rIns="91440" bIns="45720" rtlCol="0" anchor="ctr"/>
-          <a:lstStyle>
-            <a:lvl1pPr algn="ctr">
-              <a:defRPr sz="1100" baseline="0">
-                <a:solidFill>
-                  <a:schemeClr val="accent1">
-                    <a:lumMod val="60000"/>
-                    <a:lumOff val="40000"/>
-                  </a:schemeClr>
-                </a:solidFill>
-              </a:defRPr>
-            </a:lvl1pPr>
-          </a:lstStyle>
-          <a:p>
-            <a:endParaRPr lang="en-GB"/>
-          </a:p>
-        </p:txBody>
-      </p:sp>
-      <p:sp>
-        <p:nvSpPr>
-          <p:cNvPr id="6" name="Slide Number Placeholder 5"/>
-          <p:cNvSpPr>
-            <a:spLocks noGrp="1"/>
-          </p:cNvSpPr>
-          <p:nvPr>
-            <p:ph type="sldNum" sz="quarter" idx="4"/>
-          </p:nvPr>
-        </p:nvSpPr>
-        <p:spPr bwMode="white">
-          <a:xfrm>
-            <a:off x="6675120" y="6364224"/>
+            <a:off x="457200" y="6356350"/>
             <a:ext cx="2133600" cy="365125"/>
           </a:xfrm>
           <a:prstGeom prst="rect">
@@ -2948,20 +2680,99 @@
         <p:txBody>
           <a:bodyPr vert="horz" lIns="91440" tIns="45720" rIns="91440" bIns="45720" rtlCol="0" anchor="ctr"/>
           <a:lstStyle>
-            <a:lvl1pPr algn="r">
-              <a:defRPr sz="1200" b="1" baseline="0">
+            <a:lvl1pPr algn="l">
+              <a:defRPr sz="1200">
                 <a:solidFill>
-                  <a:schemeClr val="accent1">
-                    <a:lumMod val="60000"/>
-                    <a:lumOff val="40000"/>
+                  <a:schemeClr val="tx1">
+                    <a:tint val="75000"/>
                   </a:schemeClr>
                 </a:solidFill>
               </a:defRPr>
             </a:lvl1pPr>
           </a:lstStyle>
           <a:p>
+            <a:fld id="{7F97EE62-E3D0-4E7B-B469-EAEE700658EE}" type="datetimeFigureOut">
+              <a:rPr lang="en-GB" smtClean="0"/>
+              <a:pPr/>
+              <a:t>19/02/2012</a:t>
+            </a:fld>
+            <a:endParaRPr lang="en-GB"/>
+          </a:p>
+        </p:txBody>
+      </p:sp>
+      <p:sp>
+        <p:nvSpPr>
+          <p:cNvPr id="5" name="Footer Placeholder 4"/>
+          <p:cNvSpPr>
+            <a:spLocks noGrp="1"/>
+          </p:cNvSpPr>
+          <p:nvPr>
+            <p:ph type="ftr" sz="quarter" idx="3"/>
+          </p:nvPr>
+        </p:nvSpPr>
+        <p:spPr>
+          <a:xfrm>
+            <a:off x="3124200" y="6356350"/>
+            <a:ext cx="2895600" cy="365125"/>
+          </a:xfrm>
+          <a:prstGeom prst="rect">
+            <a:avLst/>
+          </a:prstGeom>
+        </p:spPr>
+        <p:txBody>
+          <a:bodyPr vert="horz" lIns="91440" tIns="45720" rIns="91440" bIns="45720" rtlCol="0" anchor="ctr"/>
+          <a:lstStyle>
+            <a:lvl1pPr algn="ctr">
+              <a:defRPr sz="1200">
+                <a:solidFill>
+                  <a:schemeClr val="tx1">
+                    <a:tint val="75000"/>
+                  </a:schemeClr>
+                </a:solidFill>
+              </a:defRPr>
+            </a:lvl1pPr>
+          </a:lstStyle>
+          <a:p>
+            <a:endParaRPr lang="en-GB"/>
+          </a:p>
+        </p:txBody>
+      </p:sp>
+      <p:sp>
+        <p:nvSpPr>
+          <p:cNvPr id="6" name="Slide Number Placeholder 5"/>
+          <p:cNvSpPr>
+            <a:spLocks noGrp="1"/>
+          </p:cNvSpPr>
+          <p:nvPr>
+            <p:ph type="sldNum" sz="quarter" idx="4"/>
+          </p:nvPr>
+        </p:nvSpPr>
+        <p:spPr>
+          <a:xfrm>
+            <a:off x="6553200" y="6356350"/>
+            <a:ext cx="2133600" cy="365125"/>
+          </a:xfrm>
+          <a:prstGeom prst="rect">
+            <a:avLst/>
+          </a:prstGeom>
+        </p:spPr>
+        <p:txBody>
+          <a:bodyPr vert="horz" lIns="91440" tIns="45720" rIns="91440" bIns="45720" rtlCol="0" anchor="ctr"/>
+          <a:lstStyle>
+            <a:lvl1pPr algn="r">
+              <a:defRPr sz="1200">
+                <a:solidFill>
+                  <a:schemeClr val="tx1">
+                    <a:tint val="75000"/>
+                  </a:schemeClr>
+                </a:solidFill>
+              </a:defRPr>
+            </a:lvl1pPr>
+          </a:lstStyle>
+          <a:p>
             <a:fld id="{5D8511BD-094F-4FD0-B9E7-C347FC64F4DF}" type="slidenum">
               <a:rPr lang="en-GB" smtClean="0"/>
+              <a:pPr/>
               <a:t>‹#›</a:t>
             </a:fld>
             <a:endParaRPr lang="en-GB"/>
@@ -2972,17 +2783,17 @@
   </p:cSld>
   <p:clrMap bg1="lt1" tx1="dk1" bg2="lt2" tx2="dk2" accent1="accent1" accent2="accent2" accent3="accent3" accent4="accent4" accent5="accent5" accent6="accent6" hlink="hlink" folHlink="folHlink"/>
   <p:sldLayoutIdLst>
-    <p:sldLayoutId id="2147483661" r:id="rId1"/>
-    <p:sldLayoutId id="2147483662" r:id="rId2"/>
-    <p:sldLayoutId id="2147483663" r:id="rId3"/>
-    <p:sldLayoutId id="2147483664" r:id="rId4"/>
-    <p:sldLayoutId id="2147483665" r:id="rId5"/>
-    <p:sldLayoutId id="2147483666" r:id="rId6"/>
-    <p:sldLayoutId id="2147483667" r:id="rId7"/>
-    <p:sldLayoutId id="2147483668" r:id="rId8"/>
-    <p:sldLayoutId id="2147483669" r:id="rId9"/>
-    <p:sldLayoutId id="2147483670" r:id="rId10"/>
-    <p:sldLayoutId id="2147483671" r:id="rId11"/>
+    <p:sldLayoutId id="2147483673" r:id="rId1"/>
+    <p:sldLayoutId id="2147483674" r:id="rId2"/>
+    <p:sldLayoutId id="2147483675" r:id="rId3"/>
+    <p:sldLayoutId id="2147483676" r:id="rId4"/>
+    <p:sldLayoutId id="2147483677" r:id="rId5"/>
+    <p:sldLayoutId id="2147483678" r:id="rId6"/>
+    <p:sldLayoutId id="2147483679" r:id="rId7"/>
+    <p:sldLayoutId id="2147483680" r:id="rId8"/>
+    <p:sldLayoutId id="2147483681" r:id="rId9"/>
+    <p:sldLayoutId id="2147483682" r:id="rId10"/>
+    <p:sldLayoutId id="2147483683" r:id="rId11"/>
   </p:sldLayoutIdLst>
   <p:txStyles>
     <p:titleStyle>
@@ -2991,7 +2802,7 @@
           <a:spcPct val="0"/>
         </a:spcBef>
         <a:buNone/>
-        <a:defRPr sz="3600" kern="1200" cap="all" spc="300" baseline="0">
+        <a:defRPr sz="4400" kern="1200">
           <a:solidFill>
             <a:schemeClr val="tx1"/>
           </a:solidFill>
@@ -3000,75 +2811,15 @@
           <a:cs typeface="+mj-cs"/>
         </a:defRPr>
       </a:lvl1pPr>
-      <a:lvl2pPr eaLnBrk="1" hangingPunct="1">
-        <a:defRPr>
-          <a:solidFill>
-            <a:schemeClr val="tx2"/>
-          </a:solidFill>
-        </a:defRPr>
-      </a:lvl2pPr>
-      <a:lvl3pPr eaLnBrk="1" hangingPunct="1">
-        <a:defRPr>
-          <a:solidFill>
-            <a:schemeClr val="tx2"/>
-          </a:solidFill>
-        </a:defRPr>
-      </a:lvl3pPr>
-      <a:lvl4pPr eaLnBrk="1" hangingPunct="1">
-        <a:defRPr>
-          <a:solidFill>
-            <a:schemeClr val="tx2"/>
-          </a:solidFill>
-        </a:defRPr>
-      </a:lvl4pPr>
-      <a:lvl5pPr eaLnBrk="1" hangingPunct="1">
-        <a:defRPr>
-          <a:solidFill>
-            <a:schemeClr val="tx2"/>
-          </a:solidFill>
-        </a:defRPr>
-      </a:lvl5pPr>
-      <a:lvl6pPr eaLnBrk="1" hangingPunct="1">
-        <a:defRPr>
-          <a:solidFill>
-            <a:schemeClr val="tx2"/>
-          </a:solidFill>
-        </a:defRPr>
-      </a:lvl6pPr>
-      <a:lvl7pPr eaLnBrk="1" hangingPunct="1">
-        <a:defRPr>
-          <a:solidFill>
-            <a:schemeClr val="tx2"/>
-          </a:solidFill>
-        </a:defRPr>
-      </a:lvl7pPr>
-      <a:lvl8pPr eaLnBrk="1" hangingPunct="1">
-        <a:defRPr>
-          <a:solidFill>
-            <a:schemeClr val="tx2"/>
-          </a:solidFill>
-        </a:defRPr>
-      </a:lvl8pPr>
-      <a:lvl9pPr eaLnBrk="1" hangingPunct="1">
-        <a:defRPr>
-          <a:solidFill>
-            <a:schemeClr val="tx2"/>
-          </a:solidFill>
-        </a:defRPr>
-      </a:lvl9pPr>
     </p:titleStyle>
     <p:bodyStyle>
-      <a:lvl1pPr marL="0" indent="-274320" algn="l" defTabSz="914400" rtl="0" eaLnBrk="1" latinLnBrk="0" hangingPunct="1">
-        <a:lnSpc>
-          <a:spcPct val="150000"/>
-        </a:lnSpc>
+      <a:lvl1pPr marL="342900" indent="-342900" algn="l" defTabSz="914400" rtl="0" eaLnBrk="1" latinLnBrk="0" hangingPunct="1">
         <a:spcBef>
           <a:spcPct val="20000"/>
         </a:spcBef>
-        <a:buClrTx/>
-        <a:buFont typeface="Wingdings" pitchFamily="2" charset="2"/>
-        <a:buChar char="v"/>
-        <a:defRPr sz="1800" kern="1200" baseline="0">
+        <a:buFont typeface="Arial" pitchFamily="34" charset="0"/>
+        <a:buChar char="•"/>
+        <a:defRPr sz="3200" kern="1200">
           <a:solidFill>
             <a:schemeClr val="tx1"/>
           </a:solidFill>
@@ -3077,14 +2828,13 @@
           <a:cs typeface="+mn-cs"/>
         </a:defRPr>
       </a:lvl1pPr>
-      <a:lvl2pPr marL="742950" indent="-228600" algn="l" defTabSz="914400" rtl="0" eaLnBrk="1" latinLnBrk="0" hangingPunct="1">
+      <a:lvl2pPr marL="742950" indent="-285750" algn="l" defTabSz="914400" rtl="0" eaLnBrk="1" latinLnBrk="0" hangingPunct="1">
         <a:spcBef>
           <a:spcPct val="20000"/>
         </a:spcBef>
-        <a:buClrTx/>
         <a:buFont typeface="Arial" pitchFamily="34" charset="0"/>
-        <a:buChar char="•"/>
-        <a:defRPr sz="1600" kern="1200" baseline="0">
+        <a:buChar char="–"/>
+        <a:defRPr sz="2800" kern="1200">
           <a:solidFill>
             <a:schemeClr val="tx1"/>
           </a:solidFill>
@@ -3097,10 +2847,9 @@
         <a:spcBef>
           <a:spcPct val="20000"/>
         </a:spcBef>
-        <a:buClrTx/>
         <a:buFont typeface="Arial" pitchFamily="34" charset="0"/>
         <a:buChar char="•"/>
-        <a:defRPr sz="1400" kern="1200" baseline="0">
+        <a:defRPr sz="2400" kern="1200">
           <a:solidFill>
             <a:schemeClr val="tx1"/>
           </a:solidFill>
@@ -3113,10 +2862,9 @@
         <a:spcBef>
           <a:spcPct val="20000"/>
         </a:spcBef>
-        <a:buClrTx/>
         <a:buFont typeface="Arial" pitchFamily="34" charset="0"/>
-        <a:buChar char="•"/>
-        <a:defRPr sz="1400" kern="1200" baseline="0">
+        <a:buChar char="–"/>
+        <a:defRPr sz="2000" kern="1200">
           <a:solidFill>
             <a:schemeClr val="tx1"/>
           </a:solidFill>
@@ -3129,10 +2877,9 @@
         <a:spcBef>
           <a:spcPct val="20000"/>
         </a:spcBef>
-        <a:buClrTx/>
         <a:buFont typeface="Arial" pitchFamily="34" charset="0"/>
-        <a:buChar char="•"/>
-        <a:defRPr sz="1400" kern="1200" baseline="0">
+        <a:buChar char="»"/>
+        <a:defRPr sz="2000" kern="1200">
           <a:solidFill>
             <a:schemeClr val="tx1"/>
           </a:solidFill>
@@ -3145,10 +2892,9 @@
         <a:spcBef>
           <a:spcPct val="20000"/>
         </a:spcBef>
-        <a:buClrTx/>
         <a:buFont typeface="Arial" pitchFamily="34" charset="0"/>
         <a:buChar char="•"/>
-        <a:defRPr sz="1400" kern="1200">
+        <a:defRPr sz="2000" kern="1200">
           <a:solidFill>
             <a:schemeClr val="tx1"/>
           </a:solidFill>
@@ -3161,10 +2907,9 @@
         <a:spcBef>
           <a:spcPct val="20000"/>
         </a:spcBef>
-        <a:buClrTx/>
         <a:buFont typeface="Arial" pitchFamily="34" charset="0"/>
         <a:buChar char="•"/>
-        <a:defRPr sz="1200" kern="1200">
+        <a:defRPr sz="2000" kern="1200">
           <a:solidFill>
             <a:schemeClr val="tx1"/>
           </a:solidFill>
@@ -3177,10 +2922,9 @@
         <a:spcBef>
           <a:spcPct val="20000"/>
         </a:spcBef>
-        <a:buClrTx/>
         <a:buFont typeface="Arial" pitchFamily="34" charset="0"/>
         <a:buChar char="•"/>
-        <a:defRPr sz="1200" kern="1200" baseline="0">
+        <a:defRPr sz="2000" kern="1200">
           <a:solidFill>
             <a:schemeClr val="tx1"/>
           </a:solidFill>
@@ -3193,10 +2937,9 @@
         <a:spcBef>
           <a:spcPct val="20000"/>
         </a:spcBef>
-        <a:buClrTx/>
         <a:buFont typeface="Arial" pitchFamily="34" charset="0"/>
         <a:buChar char="•"/>
-        <a:defRPr sz="1200" kern="1200">
+        <a:defRPr sz="2000" kern="1200">
           <a:solidFill>
             <a:schemeClr val="tx1"/>
           </a:solidFill>
@@ -3363,7 +3106,7 @@
         </p:spPr>
         <p:txBody>
           <a:bodyPr>
-            <a:normAutofit fontScale="85000" lnSpcReduction="10000"/>
+            <a:normAutofit fontScale="85000" lnSpcReduction="20000"/>
           </a:bodyPr>
           <a:lstStyle/>
           <a:p>
@@ -3395,7 +3138,7 @@
     </p:spTree>
     <p:extLst>
       <p:ext uri="{BB962C8B-B14F-4D97-AF65-F5344CB8AC3E}">
-        <p14:creationId xmlns:p14="http://schemas.microsoft.com/office/powerpoint/2010/main" val="504168143"/>
+        <p14:creationId xmlns:p14="http://schemas.microsoft.com/office/powerpoint/2010/main" xmlns="" val="504168143"/>
       </p:ext>
     </p:extLst>
   </p:cSld>
@@ -3457,7 +3200,9 @@
         </p:nvSpPr>
         <p:spPr/>
         <p:txBody>
-          <a:bodyPr/>
+          <a:bodyPr>
+            <a:normAutofit/>
+          </a:bodyPr>
           <a:lstStyle/>
           <a:p>
             <a:r>
@@ -3472,26 +3217,38 @@
             </a:r>
           </a:p>
           <a:p>
-            <a:pPr lvl="1"/>
             <a:r>
               <a:rPr lang="en-GB" dirty="0" smtClean="0"/>
-              <a:t>Basic active contours</a:t>
-            </a:r>
-          </a:p>
-          <a:p>
-            <a:pPr lvl="1"/>
-            <a:r>
-              <a:rPr lang="en-GB" smtClean="0"/>
-              <a:t>Level sets</a:t>
-            </a:r>
-            <a:endParaRPr lang="en-GB"/>
+              <a:t>Implementation</a:t>
+            </a:r>
+          </a:p>
+          <a:p>
+            <a:r>
+              <a:rPr lang="en-GB" dirty="0" smtClean="0"/>
+              <a:t>Results</a:t>
+            </a:r>
+          </a:p>
+          <a:p>
+            <a:r>
+              <a:rPr lang="en-GB" dirty="0" smtClean="0"/>
+              <a:t>Demo</a:t>
+            </a:r>
+          </a:p>
+          <a:p>
+            <a:r>
+              <a:rPr lang="en-GB" dirty="0" smtClean="0"/>
+              <a:t>Extensions</a:t>
+            </a:r>
+          </a:p>
+          <a:p>
+            <a:endParaRPr lang="en-GB" dirty="0"/>
           </a:p>
         </p:txBody>
       </p:sp>
     </p:spTree>
     <p:extLst>
       <p:ext uri="{BB962C8B-B14F-4D97-AF65-F5344CB8AC3E}">
-        <p14:creationId xmlns:p14="http://schemas.microsoft.com/office/powerpoint/2010/main" val="3109711924"/>
+        <p14:creationId xmlns:p14="http://schemas.microsoft.com/office/powerpoint/2010/main" xmlns="" val="3109711924"/>
       </p:ext>
     </p:extLst>
   </p:cSld>
@@ -3579,7 +3336,7 @@
     </p:spTree>
     <p:extLst>
       <p:ext uri="{BB962C8B-B14F-4D97-AF65-F5344CB8AC3E}">
-        <p14:creationId xmlns:p14="http://schemas.microsoft.com/office/powerpoint/2010/main" val="3674118470"/>
+        <p14:creationId xmlns:p14="http://schemas.microsoft.com/office/powerpoint/2010/main" xmlns="" val="3674118470"/>
       </p:ext>
     </p:extLst>
   </p:cSld>
@@ -3589,10 +3346,314 @@
 </p:sld>
 </file>
 
+<file path=ppt/slides/slide4.xml><?xml version="1.0" encoding="utf-8"?>
+<p:sld xmlns:a="http://schemas.openxmlformats.org/drawingml/2006/main" xmlns:r="http://schemas.openxmlformats.org/officeDocument/2006/relationships" xmlns:p="http://schemas.openxmlformats.org/presentationml/2006/main">
+  <p:cSld>
+    <p:spTree>
+      <p:nvGrpSpPr>
+        <p:cNvPr id="1" name=""/>
+        <p:cNvGrpSpPr/>
+        <p:nvPr/>
+      </p:nvGrpSpPr>
+      <p:grpSpPr>
+        <a:xfrm>
+          <a:off x="0" y="0"/>
+          <a:ext cx="0" cy="0"/>
+          <a:chOff x="0" y="0"/>
+          <a:chExt cx="0" cy="0"/>
+        </a:xfrm>
+      </p:grpSpPr>
+      <p:sp>
+        <p:nvSpPr>
+          <p:cNvPr id="2" name="Title 1"/>
+          <p:cNvSpPr>
+            <a:spLocks noGrp="1"/>
+          </p:cNvSpPr>
+          <p:nvPr>
+            <p:ph type="title"/>
+          </p:nvPr>
+        </p:nvSpPr>
+        <p:spPr/>
+        <p:txBody>
+          <a:bodyPr/>
+          <a:lstStyle/>
+          <a:p>
+            <a:r>
+              <a:rPr lang="en-GB" dirty="0" smtClean="0"/>
+              <a:t>Theory – Basic Active Contours</a:t>
+            </a:r>
+            <a:endParaRPr lang="en-GB" dirty="0"/>
+          </a:p>
+        </p:txBody>
+      </p:sp>
+      <p:sp>
+        <p:nvSpPr>
+          <p:cNvPr id="3" name="Content Placeholder 2"/>
+          <p:cNvSpPr>
+            <a:spLocks noGrp="1"/>
+          </p:cNvSpPr>
+          <p:nvPr>
+            <p:ph idx="1"/>
+          </p:nvPr>
+        </p:nvSpPr>
+        <p:spPr/>
+        <p:txBody>
+          <a:bodyPr/>
+          <a:lstStyle/>
+          <a:p>
+            <a:r>
+              <a:rPr lang="en-GB" dirty="0" smtClean="0"/>
+              <a:t>What is it, what does it do? How does it work?</a:t>
+            </a:r>
+            <a:endParaRPr lang="en-GB" dirty="0"/>
+          </a:p>
+        </p:txBody>
+      </p:sp>
+    </p:spTree>
+  </p:cSld>
+  <p:clrMapOvr>
+    <a:masterClrMapping/>
+  </p:clrMapOvr>
+</p:sld>
+</file>
+
+<file path=ppt/slides/slide5.xml><?xml version="1.0" encoding="utf-8"?>
+<p:sld xmlns:a="http://schemas.openxmlformats.org/drawingml/2006/main" xmlns:r="http://schemas.openxmlformats.org/officeDocument/2006/relationships" xmlns:p="http://schemas.openxmlformats.org/presentationml/2006/main">
+  <p:cSld>
+    <p:spTree>
+      <p:nvGrpSpPr>
+        <p:cNvPr id="1" name=""/>
+        <p:cNvGrpSpPr/>
+        <p:nvPr/>
+      </p:nvGrpSpPr>
+      <p:grpSpPr>
+        <a:xfrm>
+          <a:off x="0" y="0"/>
+          <a:ext cx="0" cy="0"/>
+          <a:chOff x="0" y="0"/>
+          <a:chExt cx="0" cy="0"/>
+        </a:xfrm>
+      </p:grpSpPr>
+      <p:sp>
+        <p:nvSpPr>
+          <p:cNvPr id="2" name="Title 1"/>
+          <p:cNvSpPr>
+            <a:spLocks noGrp="1"/>
+          </p:cNvSpPr>
+          <p:nvPr>
+            <p:ph type="title"/>
+          </p:nvPr>
+        </p:nvSpPr>
+        <p:spPr/>
+        <p:txBody>
+          <a:bodyPr/>
+          <a:lstStyle/>
+          <a:p>
+            <a:r>
+              <a:rPr lang="en-GB" dirty="0" smtClean="0"/>
+              <a:t>Theory – Level Sets</a:t>
+            </a:r>
+            <a:endParaRPr lang="en-GB" dirty="0"/>
+          </a:p>
+        </p:txBody>
+      </p:sp>
+      <p:sp>
+        <p:nvSpPr>
+          <p:cNvPr id="3" name="Content Placeholder 2"/>
+          <p:cNvSpPr>
+            <a:spLocks noGrp="1"/>
+          </p:cNvSpPr>
+          <p:nvPr>
+            <p:ph idx="1"/>
+          </p:nvPr>
+        </p:nvSpPr>
+        <p:spPr/>
+        <p:txBody>
+          <a:bodyPr/>
+          <a:lstStyle/>
+          <a:p>
+            <a:r>
+              <a:rPr lang="en-GB" dirty="0" smtClean="0"/>
+              <a:t>What are they, why would we want them?</a:t>
+            </a:r>
+            <a:endParaRPr lang="en-GB" dirty="0"/>
+          </a:p>
+        </p:txBody>
+      </p:sp>
+    </p:spTree>
+  </p:cSld>
+  <p:clrMapOvr>
+    <a:masterClrMapping/>
+  </p:clrMapOvr>
+</p:sld>
+</file>
+
+<file path=ppt/slides/slide6.xml><?xml version="1.0" encoding="utf-8"?>
+<p:sld xmlns:a="http://schemas.openxmlformats.org/drawingml/2006/main" xmlns:r="http://schemas.openxmlformats.org/officeDocument/2006/relationships" xmlns:p="http://schemas.openxmlformats.org/presentationml/2006/main">
+  <p:cSld>
+    <p:spTree>
+      <p:nvGrpSpPr>
+        <p:cNvPr id="1" name=""/>
+        <p:cNvGrpSpPr/>
+        <p:nvPr/>
+      </p:nvGrpSpPr>
+      <p:grpSpPr>
+        <a:xfrm>
+          <a:off x="0" y="0"/>
+          <a:ext cx="0" cy="0"/>
+          <a:chOff x="0" y="0"/>
+          <a:chExt cx="0" cy="0"/>
+        </a:xfrm>
+      </p:grpSpPr>
+      <p:sp>
+        <p:nvSpPr>
+          <p:cNvPr id="2" name="Title 1"/>
+          <p:cNvSpPr>
+            <a:spLocks noGrp="1"/>
+          </p:cNvSpPr>
+          <p:nvPr>
+            <p:ph type="title"/>
+          </p:nvPr>
+        </p:nvSpPr>
+        <p:spPr/>
+        <p:txBody>
+          <a:bodyPr/>
+          <a:lstStyle/>
+          <a:p>
+            <a:r>
+              <a:rPr lang="en-GB" dirty="0" smtClean="0"/>
+              <a:t>Theory – Using Level Sets</a:t>
+            </a:r>
+            <a:endParaRPr lang="en-GB" dirty="0"/>
+          </a:p>
+        </p:txBody>
+      </p:sp>
+      <p:sp>
+        <p:nvSpPr>
+          <p:cNvPr id="3" name="Content Placeholder 2"/>
+          <p:cNvSpPr>
+            <a:spLocks noGrp="1"/>
+          </p:cNvSpPr>
+          <p:nvPr>
+            <p:ph idx="1"/>
+          </p:nvPr>
+        </p:nvSpPr>
+        <p:spPr/>
+        <p:txBody>
+          <a:bodyPr/>
+          <a:lstStyle/>
+          <a:p>
+            <a:r>
+              <a:rPr lang="en-GB" dirty="0" smtClean="0"/>
+              <a:t>Getting level sets into snakes</a:t>
+            </a:r>
+          </a:p>
+          <a:p>
+            <a:r>
+              <a:rPr lang="en-GB" dirty="0" smtClean="0"/>
+              <a:t>Introduce the Maths</a:t>
+            </a:r>
+            <a:endParaRPr lang="en-GB" dirty="0"/>
+          </a:p>
+        </p:txBody>
+      </p:sp>
+    </p:spTree>
+  </p:cSld>
+  <p:clrMapOvr>
+    <a:masterClrMapping/>
+  </p:clrMapOvr>
+</p:sld>
+</file>
+
+<file path=ppt/slides/slide7.xml><?xml version="1.0" encoding="utf-8"?>
+<p:sld xmlns:a="http://schemas.openxmlformats.org/drawingml/2006/main" xmlns:r="http://schemas.openxmlformats.org/officeDocument/2006/relationships" xmlns:p="http://schemas.openxmlformats.org/presentationml/2006/main">
+  <p:cSld>
+    <p:spTree>
+      <p:nvGrpSpPr>
+        <p:cNvPr id="1" name=""/>
+        <p:cNvGrpSpPr/>
+        <p:nvPr/>
+      </p:nvGrpSpPr>
+      <p:grpSpPr>
+        <a:xfrm>
+          <a:off x="0" y="0"/>
+          <a:ext cx="0" cy="0"/>
+          <a:chOff x="0" y="0"/>
+          <a:chExt cx="0" cy="0"/>
+        </a:xfrm>
+      </p:grpSpPr>
+      <p:sp>
+        <p:nvSpPr>
+          <p:cNvPr id="2" name="Title 1"/>
+          <p:cNvSpPr>
+            <a:spLocks noGrp="1"/>
+          </p:cNvSpPr>
+          <p:nvPr>
+            <p:ph type="title"/>
+          </p:nvPr>
+        </p:nvSpPr>
+        <p:spPr/>
+        <p:txBody>
+          <a:bodyPr/>
+          <a:lstStyle/>
+          <a:p>
+            <a:r>
+              <a:rPr lang="en-GB" dirty="0" smtClean="0"/>
+              <a:t>Theory – Minimising the Energy</a:t>
+            </a:r>
+            <a:endParaRPr lang="en-GB" dirty="0"/>
+          </a:p>
+        </p:txBody>
+      </p:sp>
+      <p:sp>
+        <p:nvSpPr>
+          <p:cNvPr id="3" name="Content Placeholder 2"/>
+          <p:cNvSpPr>
+            <a:spLocks noGrp="1"/>
+          </p:cNvSpPr>
+          <p:nvPr>
+            <p:ph idx="1"/>
+          </p:nvPr>
+        </p:nvSpPr>
+        <p:spPr/>
+        <p:txBody>
+          <a:bodyPr/>
+          <a:lstStyle/>
+          <a:p>
+            <a:r>
+              <a:rPr lang="en-GB" dirty="0" smtClean="0"/>
+              <a:t>Show diagrams for how the edge is the minimum energy</a:t>
+            </a:r>
+          </a:p>
+          <a:p>
+            <a:r>
+              <a:rPr lang="en-GB" dirty="0" smtClean="0"/>
+              <a:t>Continue maths with the fact that we need to minimise: goes neatly into </a:t>
+            </a:r>
+            <a:r>
+              <a:rPr lang="en-GB" dirty="0" err="1" smtClean="0"/>
+              <a:t>michael’s</a:t>
+            </a:r>
+            <a:r>
+              <a:rPr lang="en-GB" dirty="0" smtClean="0"/>
+              <a:t> implementation</a:t>
+            </a:r>
+            <a:endParaRPr lang="en-GB" dirty="0"/>
+          </a:p>
+        </p:txBody>
+      </p:sp>
+    </p:spTree>
+  </p:cSld>
+  <p:clrMapOvr>
+    <a:masterClrMapping/>
+  </p:clrMapOvr>
+</p:sld>
+</file>
+
 <file path=ppt/theme/theme1.xml><?xml version="1.0" encoding="utf-8"?>
-<a:theme xmlns:a="http://schemas.openxmlformats.org/drawingml/2006/main" name="Couture">
+<a:theme xmlns:a="http://schemas.openxmlformats.org/drawingml/2006/main" name="Office Theme">
   <a:themeElements>
-    <a:clrScheme name="Couture">
+    <a:clrScheme name="Office">
       <a:dk1>
         <a:sysClr val="windowText" lastClr="000000"/>
       </a:dk1>
@@ -3600,50 +3661,82 @@
         <a:sysClr val="window" lastClr="FFFFFF"/>
       </a:lt1>
       <a:dk2>
-        <a:srgbClr val="37302A"/>
+        <a:srgbClr val="1F497D"/>
       </a:dk2>
       <a:lt2>
-        <a:srgbClr val="D0CCB9"/>
+        <a:srgbClr val="EEECE1"/>
       </a:lt2>
       <a:accent1>
-        <a:srgbClr val="9E8E5C"/>
+        <a:srgbClr val="4F81BD"/>
       </a:accent1>
       <a:accent2>
-        <a:srgbClr val="A09781"/>
+        <a:srgbClr val="C0504D"/>
       </a:accent2>
       <a:accent3>
-        <a:srgbClr val="85776D"/>
+        <a:srgbClr val="9BBB59"/>
       </a:accent3>
       <a:accent4>
-        <a:srgbClr val="AEAFA9"/>
+        <a:srgbClr val="8064A2"/>
       </a:accent4>
       <a:accent5>
-        <a:srgbClr val="8D878B"/>
+        <a:srgbClr val="4BACC6"/>
       </a:accent5>
       <a:accent6>
-        <a:srgbClr val="6B6149"/>
+        <a:srgbClr val="F79646"/>
       </a:accent6>
       <a:hlink>
-        <a:srgbClr val="B6A272"/>
+        <a:srgbClr val="0000FF"/>
       </a:hlink>
       <a:folHlink>
-        <a:srgbClr val="8A784F"/>
+        <a:srgbClr val="800080"/>
       </a:folHlink>
     </a:clrScheme>
-    <a:fontScheme name="Black Tie">
+    <a:fontScheme name="Office">
       <a:majorFont>
-        <a:latin typeface="Garamond"/>
+        <a:latin typeface="Calibri"/>
         <a:ea typeface=""/>
         <a:cs typeface=""/>
-        <a:font script="Grek" typeface="Constantia"/>
-        <a:font script="Cyrl" typeface="Constantia"/>
-        <a:font script="Jpan" typeface="ＭＳ Ｐ明朝"/>
-        <a:font script="Hang" typeface="궁서"/>
-        <a:font script="Hans" typeface="仿宋"/>
-        <a:font script="Hant" typeface="標楷體"/>
+        <a:font script="Jpan" typeface="ＭＳ Ｐゴシック"/>
+        <a:font script="Hang" typeface="맑은 고딕"/>
+        <a:font script="Hans" typeface="宋体"/>
+        <a:font script="Hant" typeface="新細明體"/>
         <a:font script="Arab" typeface="Times New Roman"/>
         <a:font script="Hebr" typeface="Times New Roman"/>
         <a:font script="Thai" typeface="Angsana New"/>
+        <a:font script="Ethi" typeface="Nyala"/>
+        <a:font script="Beng" typeface="Vrinda"/>
+        <a:font script="Gujr" typeface="Shruti"/>
+        <a:font script="Khmr" typeface="MoolBoran"/>
+        <a:font script="Knda" typeface="Tunga"/>
+        <a:font script="Guru" typeface="Raavi"/>
+        <a:font script="Cans" typeface="Euphemia"/>
+        <a:font script="Cher" typeface="Plantagenet Cherokee"/>
+        <a:font script="Yiii" typeface="Microsoft Yi Baiti"/>
+        <a:font script="Tibt" typeface="Microsoft Himalaya"/>
+        <a:font script="Thaa" typeface="MV Boli"/>
+        <a:font script="Deva" typeface="Mangal"/>
+        <a:font script="Telu" typeface="Gautami"/>
+        <a:font script="Taml" typeface="Latha"/>
+        <a:font script="Syrc" typeface="Estrangelo Edessa"/>
+        <a:font script="Orya" typeface="Kalinga"/>
+        <a:font script="Mlym" typeface="Kartika"/>
+        <a:font script="Laoo" typeface="DokChampa"/>
+        <a:font script="Sinh" typeface="Iskoola Pota"/>
+        <a:font script="Mong" typeface="Mongolian Baiti"/>
+        <a:font script="Viet" typeface="Times New Roman"/>
+        <a:font script="Uigh" typeface="Microsoft Uighur"/>
+      </a:majorFont>
+      <a:minorFont>
+        <a:latin typeface="Calibri"/>
+        <a:ea typeface=""/>
+        <a:cs typeface=""/>
+        <a:font script="Jpan" typeface="ＭＳ Ｐゴシック"/>
+        <a:font script="Hang" typeface="맑은 고딕"/>
+        <a:font script="Hans" typeface="宋体"/>
+        <a:font script="Hant" typeface="新細明體"/>
+        <a:font script="Arab" typeface="Arial"/>
+        <a:font script="Hebr" typeface="Arial"/>
+        <a:font script="Thai" typeface="Cordia New"/>
         <a:font script="Ethi" typeface="Nyala"/>
         <a:font script="Beng" typeface="Vrinda"/>
         <a:font script="Gujr" typeface="Shruti"/>
@@ -3664,101 +3757,109 @@
         <a:font script="Laoo" typeface="DokChampa"/>
         <a:font script="Sinh" typeface="Iskoola Pota"/>
         <a:font script="Mong" typeface="Mongolian Baiti"/>
-        <a:font script="Viet" typeface="Times New Roman"/>
+        <a:font script="Viet" typeface="Arial"/>
         <a:font script="Uigh" typeface="Microsoft Uighur"/>
-        <a:font script="Geor" typeface="Sylfaen"/>
-      </a:majorFont>
-      <a:minorFont>
-        <a:latin typeface="Garamond"/>
-        <a:ea typeface=""/>
-        <a:cs typeface=""/>
-        <a:font script="Grek" typeface="Constantia"/>
-        <a:font script="Cyrl" typeface="Constantia"/>
-        <a:font script="Jpan" typeface="ＭＳ Ｐ明朝"/>
-        <a:font script="Hang" typeface="궁서"/>
-        <a:font script="Hans" typeface="仿宋"/>
-        <a:font script="Hant" typeface="標楷體"/>
-        <a:font script="Arab" typeface="Times New Roman"/>
-        <a:font script="Hebr" typeface="Times New Roman"/>
-        <a:font script="Thai" typeface="Angsana New"/>
-        <a:font script="Ethi" typeface="Nyala"/>
-        <a:font script="Beng" typeface="Vrinda"/>
-        <a:font script="Gujr" typeface="Shruti"/>
-        <a:font script="Khmr" typeface="DaunPenh"/>
-        <a:font script="Knda" typeface="Tunga"/>
-        <a:font script="Guru" typeface="Raavi"/>
-        <a:font script="Cans" typeface="Euphemia"/>
-        <a:font script="Cher" typeface="Plantagenet Cherokee"/>
-        <a:font script="Yiii" typeface="Microsoft Yi Baiti"/>
-        <a:font script="Tibt" typeface="Microsoft Himalaya"/>
-        <a:font script="Thaa" typeface="MV Boli"/>
-        <a:font script="Deva" typeface="Mangal"/>
-        <a:font script="Telu" typeface="Gautami"/>
-        <a:font script="Taml" typeface="Latha"/>
-        <a:font script="Syrc" typeface="Estrangelo Edessa"/>
-        <a:font script="Orya" typeface="Kalinga"/>
-        <a:font script="Mlym" typeface="Kartika"/>
-        <a:font script="Laoo" typeface="DokChampa"/>
-        <a:font script="Sinh" typeface="Iskoola Pota"/>
-        <a:font script="Mong" typeface="Mongolian Baiti"/>
-        <a:font script="Viet" typeface="Times New Roman"/>
-        <a:font script="Uigh" typeface="Microsoft Uighur"/>
-        <a:font script="Geor" typeface="Sylfaen"/>
       </a:minorFont>
     </a:fontScheme>
-    <a:fmtScheme name="Couture">
+    <a:fmtScheme name="Office">
       <a:fillStyleLst>
         <a:solidFill>
           <a:schemeClr val="phClr"/>
         </a:solidFill>
-        <a:solidFill>
-          <a:schemeClr val="phClr">
-            <a:tint val="65000"/>
-          </a:schemeClr>
-        </a:solidFill>
-        <a:solidFill>
-          <a:schemeClr val="phClr">
-            <a:shade val="80000"/>
-            <a:satMod val="180000"/>
-          </a:schemeClr>
-        </a:solidFill>
+        <a:gradFill rotWithShape="1">
+          <a:gsLst>
+            <a:gs pos="0">
+              <a:schemeClr val="phClr">
+                <a:tint val="50000"/>
+                <a:satMod val="300000"/>
+              </a:schemeClr>
+            </a:gs>
+            <a:gs pos="35000">
+              <a:schemeClr val="phClr">
+                <a:tint val="37000"/>
+                <a:satMod val="300000"/>
+              </a:schemeClr>
+            </a:gs>
+            <a:gs pos="100000">
+              <a:schemeClr val="phClr">
+                <a:tint val="15000"/>
+                <a:satMod val="350000"/>
+              </a:schemeClr>
+            </a:gs>
+          </a:gsLst>
+          <a:lin ang="16200000" scaled="1"/>
+        </a:gradFill>
+        <a:gradFill rotWithShape="1">
+          <a:gsLst>
+            <a:gs pos="0">
+              <a:schemeClr val="phClr">
+                <a:shade val="51000"/>
+                <a:satMod val="130000"/>
+              </a:schemeClr>
+            </a:gs>
+            <a:gs pos="80000">
+              <a:schemeClr val="phClr">
+                <a:shade val="93000"/>
+                <a:satMod val="130000"/>
+              </a:schemeClr>
+            </a:gs>
+            <a:gs pos="100000">
+              <a:schemeClr val="phClr">
+                <a:shade val="94000"/>
+                <a:satMod val="135000"/>
+              </a:schemeClr>
+            </a:gs>
+          </a:gsLst>
+          <a:lin ang="16200000" scaled="0"/>
+        </a:gradFill>
       </a:fillStyleLst>
       <a:lnStyleLst>
         <a:ln w="9525" cap="flat" cmpd="sng" algn="ctr">
+          <a:solidFill>
+            <a:schemeClr val="phClr">
+              <a:shade val="95000"/>
+              <a:satMod val="105000"/>
+            </a:schemeClr>
+          </a:solidFill>
+          <a:prstDash val="solid"/>
+        </a:ln>
+        <a:ln w="25400" cap="flat" cmpd="sng" algn="ctr">
           <a:solidFill>
             <a:schemeClr val="phClr"/>
           </a:solidFill>
           <a:prstDash val="solid"/>
         </a:ln>
-        <a:ln w="10795" cap="flat" cmpd="sng" algn="ctr">
+        <a:ln w="38100" cap="flat" cmpd="sng" algn="ctr">
           <a:solidFill>
             <a:schemeClr val="phClr"/>
-          </a:solidFill>
-          <a:prstDash val="solid"/>
-        </a:ln>
-        <a:ln w="17145" cap="flat" cmpd="sng" algn="ctr">
-          <a:solidFill>
-            <a:schemeClr val="phClr">
-              <a:shade val="95000"/>
-              <a:alpha val="50000"/>
-              <a:satMod val="150000"/>
-            </a:schemeClr>
           </a:solidFill>
           <a:prstDash val="solid"/>
         </a:ln>
       </a:lnStyleLst>
       <a:effectStyleLst>
         <a:effectStyle>
-          <a:effectLst/>
-        </a:effectStyle>
-        <a:effectStyle>
-          <a:effectLst/>
+          <a:effectLst>
+            <a:outerShdw blurRad="40000" dist="20000" dir="5400000" rotWithShape="0">
+              <a:srgbClr val="000000">
+                <a:alpha val="38000"/>
+              </a:srgbClr>
+            </a:outerShdw>
+          </a:effectLst>
         </a:effectStyle>
         <a:effectStyle>
           <a:effectLst>
-            <a:outerShdw blurRad="44450" dist="13970" dir="5400000" algn="ctr" rotWithShape="0">
+            <a:outerShdw blurRad="40000" dist="23000" dir="5400000" rotWithShape="0">
               <a:srgbClr val="000000">
-                <a:alpha val="45000"/>
+                <a:alpha val="35000"/>
+              </a:srgbClr>
+            </a:outerShdw>
+          </a:effectLst>
+        </a:effectStyle>
+        <a:effectStyle>
+          <a:effectLst>
+            <a:outerShdw blurRad="40000" dist="23000" dir="5400000" rotWithShape="0">
+              <a:srgbClr val="000000">
+                <a:alpha val="35000"/>
               </a:srgbClr>
             </a:outerShdw>
           </a:effectLst>
@@ -3766,10 +3867,12 @@
             <a:camera prst="orthographicFront">
               <a:rot lat="0" lon="0" rev="0"/>
             </a:camera>
-            <a:lightRig rig="twoPt" dir="tl"/>
+            <a:lightRig rig="threePt" dir="t">
+              <a:rot lat="0" lon="0" rev="1200000"/>
+            </a:lightRig>
           </a:scene3d>
-          <a:sp3d prstMaterial="flat">
-            <a:bevelT w="19050" h="31750" prst="coolSlant"/>
+          <a:sp3d>
+            <a:bevelT w="63500" h="25400"/>
           </a:sp3d>
         </a:effectStyle>
       </a:effectStyleLst>
@@ -3781,33 +3884,47 @@
           <a:gsLst>
             <a:gs pos="0">
               <a:schemeClr val="phClr">
-                <a:tint val="70000"/>
+                <a:tint val="40000"/>
+                <a:satMod val="350000"/>
+              </a:schemeClr>
+            </a:gs>
+            <a:gs pos="40000">
+              <a:schemeClr val="phClr">
+                <a:tint val="45000"/>
+                <a:shade val="99000"/>
+                <a:satMod val="350000"/>
               </a:schemeClr>
             </a:gs>
             <a:gs pos="100000">
               <a:schemeClr val="phClr">
-                <a:shade val="80000"/>
+                <a:shade val="20000"/>
+                <a:satMod val="255000"/>
               </a:schemeClr>
             </a:gs>
           </a:gsLst>
           <a:path path="circle">
-            <a:fillToRect l="50000" t="100000" r="100000" b="100000"/>
+            <a:fillToRect l="50000" t="-80000" r="50000" b="180000"/>
           </a:path>
         </a:gradFill>
-        <a:blipFill rotWithShape="1">
-          <a:blip xmlns:r="http://schemas.openxmlformats.org/officeDocument/2006/relationships" r:embed="rId1">
-            <a:duotone>
+        <a:gradFill rotWithShape="1">
+          <a:gsLst>
+            <a:gs pos="0">
+              <a:schemeClr val="phClr">
+                <a:tint val="80000"/>
+                <a:satMod val="300000"/>
+              </a:schemeClr>
+            </a:gs>
+            <a:gs pos="100000">
               <a:schemeClr val="phClr">
                 <a:shade val="30000"/>
                 <a:satMod val="200000"/>
               </a:schemeClr>
-              <a:schemeClr val="phClr">
-                <a:tint val="20000"/>
-              </a:schemeClr>
-            </a:duotone>
-          </a:blip>
-          <a:stretch/>
-        </a:blipFill>
+            </a:gs>
+          </a:gsLst>
+          <a:path path="circle">
+            <a:fillToRect l="50000" t="50000" r="50000" b="50000"/>
+          </a:path>
+        </a:gradFill>
       </a:bgFillStyleLst>
     </a:fmtScheme>
   </a:themeElements>

</xml_diff>